<commit_message>
Update DG for autofill and remark
</commit_message>
<xml_diff>
--- a/docs/diagrams/AutofillActivityDiagram.pptx
+++ b/docs/diagrams/AutofillActivityDiagram.pptx
@@ -2,12 +2,12 @@
 <file path=ppt/presentation.xml><?xml version="1.0" encoding="utf-8"?>
 <p:presentation xmlns:a="http://schemas.openxmlformats.org/drawingml/2006/main" xmlns:r="http://schemas.openxmlformats.org/officeDocument/2006/relationships" xmlns:p="http://schemas.openxmlformats.org/presentationml/2006/main" saveSubsetFonts="1">
   <p:sldMasterIdLst>
-    <p:sldMasterId id="2147483660" r:id="rId1"/>
+    <p:sldMasterId id="2147483672" r:id="rId1"/>
   </p:sldMasterIdLst>
   <p:sldIdLst>
     <p:sldId id="256" r:id="rId2"/>
   </p:sldIdLst>
-  <p:sldSz cx="18000663" cy="6858000"/>
+  <p:sldSz cx="18000663" cy="10817225"/>
   <p:notesSz cx="6858000" cy="9144000"/>
   <p:defaultTextStyle>
     <a:defPPr>
@@ -141,15 +141,15 @@
         </p:nvSpPr>
         <p:spPr>
           <a:xfrm>
-            <a:off x="2250083" y="1122363"/>
-            <a:ext cx="13500497" cy="2387600"/>
+            <a:off x="2250083" y="1770320"/>
+            <a:ext cx="13500497" cy="3765997"/>
           </a:xfrm>
         </p:spPr>
         <p:txBody>
           <a:bodyPr anchor="b"/>
           <a:lstStyle>
             <a:lvl1pPr algn="ctr">
-              <a:defRPr sz="6000"/>
+              <a:defRPr sz="8858"/>
             </a:lvl1pPr>
           </a:lstStyle>
           <a:p>
@@ -173,8 +173,8 @@
         </p:nvSpPr>
         <p:spPr>
           <a:xfrm>
-            <a:off x="2250083" y="3602038"/>
-            <a:ext cx="13500497" cy="1655762"/>
+            <a:off x="2250083" y="5681548"/>
+            <a:ext cx="13500497" cy="2611658"/>
           </a:xfrm>
         </p:spPr>
         <p:txBody>
@@ -182,39 +182,39 @@
           <a:lstStyle>
             <a:lvl1pPr marL="0" indent="0" algn="ctr">
               <a:buNone/>
-              <a:defRPr sz="2400"/>
+              <a:defRPr sz="3543"/>
             </a:lvl1pPr>
-            <a:lvl2pPr marL="457200" indent="0" algn="ctr">
-              <a:buNone/>
-              <a:defRPr sz="2000"/>
+            <a:lvl2pPr marL="675010" indent="0" algn="ctr">
+              <a:buNone/>
+              <a:defRPr sz="2953"/>
             </a:lvl2pPr>
-            <a:lvl3pPr marL="914400" indent="0" algn="ctr">
-              <a:buNone/>
-              <a:defRPr sz="1800"/>
+            <a:lvl3pPr marL="1350020" indent="0" algn="ctr">
+              <a:buNone/>
+              <a:defRPr sz="2658"/>
             </a:lvl3pPr>
-            <a:lvl4pPr marL="1371600" indent="0" algn="ctr">
-              <a:buNone/>
-              <a:defRPr sz="1600"/>
+            <a:lvl4pPr marL="2025030" indent="0" algn="ctr">
+              <a:buNone/>
+              <a:defRPr sz="2362"/>
             </a:lvl4pPr>
-            <a:lvl5pPr marL="1828800" indent="0" algn="ctr">
-              <a:buNone/>
-              <a:defRPr sz="1600"/>
+            <a:lvl5pPr marL="2700040" indent="0" algn="ctr">
+              <a:buNone/>
+              <a:defRPr sz="2362"/>
             </a:lvl5pPr>
-            <a:lvl6pPr marL="2286000" indent="0" algn="ctr">
-              <a:buNone/>
-              <a:defRPr sz="1600"/>
+            <a:lvl6pPr marL="3375050" indent="0" algn="ctr">
+              <a:buNone/>
+              <a:defRPr sz="2362"/>
             </a:lvl6pPr>
-            <a:lvl7pPr marL="2743200" indent="0" algn="ctr">
-              <a:buNone/>
-              <a:defRPr sz="1600"/>
+            <a:lvl7pPr marL="4050060" indent="0" algn="ctr">
+              <a:buNone/>
+              <a:defRPr sz="2362"/>
             </a:lvl7pPr>
-            <a:lvl8pPr marL="3200400" indent="0" algn="ctr">
-              <a:buNone/>
-              <a:defRPr sz="1600"/>
+            <a:lvl8pPr marL="4725071" indent="0" algn="ctr">
+              <a:buNone/>
+              <a:defRPr sz="2362"/>
             </a:lvl8pPr>
-            <a:lvl9pPr marL="3657600" indent="0" algn="ctr">
-              <a:buNone/>
-              <a:defRPr sz="1600"/>
+            <a:lvl9pPr marL="5400081" indent="0" algn="ctr">
+              <a:buNone/>
+              <a:defRPr sz="2362"/>
             </a:lvl9pPr>
           </a:lstStyle>
           <a:p>
@@ -243,7 +243,7 @@
           <a:p>
             <a:fld id="{542F47FF-5056-41FF-A1F8-23A414798AA4}" type="datetimeFigureOut">
               <a:rPr lang="en-SG" smtClean="0"/>
-              <a:t>27/3/2018</a:t>
+              <a:t>9/4/2018</a:t>
             </a:fld>
             <a:endParaRPr lang="en-SG"/>
           </a:p>
@@ -294,7 +294,7 @@
     </p:spTree>
     <p:extLst>
       <p:ext uri="{BB962C8B-B14F-4D97-AF65-F5344CB8AC3E}">
-        <p14:creationId xmlns:p14="http://schemas.microsoft.com/office/powerpoint/2010/main" val="1424086974"/>
+        <p14:creationId xmlns:p14="http://schemas.microsoft.com/office/powerpoint/2010/main" val="2346692158"/>
       </p:ext>
     </p:extLst>
   </p:cSld>
@@ -413,7 +413,7 @@
           <a:p>
             <a:fld id="{542F47FF-5056-41FF-A1F8-23A414798AA4}" type="datetimeFigureOut">
               <a:rPr lang="en-SG" smtClean="0"/>
-              <a:t>27/3/2018</a:t>
+              <a:t>9/4/2018</a:t>
             </a:fld>
             <a:endParaRPr lang="en-SG"/>
           </a:p>
@@ -464,7 +464,7 @@
     </p:spTree>
     <p:extLst>
       <p:ext uri="{BB962C8B-B14F-4D97-AF65-F5344CB8AC3E}">
-        <p14:creationId xmlns:p14="http://schemas.microsoft.com/office/powerpoint/2010/main" val="98415201"/>
+        <p14:creationId xmlns:p14="http://schemas.microsoft.com/office/powerpoint/2010/main" val="1426127310"/>
       </p:ext>
     </p:extLst>
   </p:cSld>
@@ -503,8 +503,8 @@
         </p:nvSpPr>
         <p:spPr>
           <a:xfrm>
-            <a:off x="12881724" y="365125"/>
-            <a:ext cx="3881393" cy="5811838"/>
+            <a:off x="12881724" y="575917"/>
+            <a:ext cx="3881393" cy="9167098"/>
           </a:xfrm>
         </p:spPr>
         <p:txBody>
@@ -531,8 +531,8 @@
         </p:nvSpPr>
         <p:spPr>
           <a:xfrm>
-            <a:off x="1237545" y="365125"/>
-            <a:ext cx="11419171" cy="5811838"/>
+            <a:off x="1237545" y="575917"/>
+            <a:ext cx="11419171" cy="9167098"/>
           </a:xfrm>
         </p:spPr>
         <p:txBody>
@@ -593,7 +593,7 @@
           <a:p>
             <a:fld id="{542F47FF-5056-41FF-A1F8-23A414798AA4}" type="datetimeFigureOut">
               <a:rPr lang="en-SG" smtClean="0"/>
-              <a:t>27/3/2018</a:t>
+              <a:t>9/4/2018</a:t>
             </a:fld>
             <a:endParaRPr lang="en-SG"/>
           </a:p>
@@ -644,7 +644,7 @@
     </p:spTree>
     <p:extLst>
       <p:ext uri="{BB962C8B-B14F-4D97-AF65-F5344CB8AC3E}">
-        <p14:creationId xmlns:p14="http://schemas.microsoft.com/office/powerpoint/2010/main" val="1950300276"/>
+        <p14:creationId xmlns:p14="http://schemas.microsoft.com/office/powerpoint/2010/main" val="474524129"/>
       </p:ext>
     </p:extLst>
   </p:cSld>
@@ -763,7 +763,7 @@
           <a:p>
             <a:fld id="{542F47FF-5056-41FF-A1F8-23A414798AA4}" type="datetimeFigureOut">
               <a:rPr lang="en-SG" smtClean="0"/>
-              <a:t>27/3/2018</a:t>
+              <a:t>9/4/2018</a:t>
             </a:fld>
             <a:endParaRPr lang="en-SG"/>
           </a:p>
@@ -814,7 +814,7 @@
     </p:spTree>
     <p:extLst>
       <p:ext uri="{BB962C8B-B14F-4D97-AF65-F5344CB8AC3E}">
-        <p14:creationId xmlns:p14="http://schemas.microsoft.com/office/powerpoint/2010/main" val="2074688293"/>
+        <p14:creationId xmlns:p14="http://schemas.microsoft.com/office/powerpoint/2010/main" val="338897551"/>
       </p:ext>
     </p:extLst>
   </p:cSld>
@@ -853,15 +853,15 @@
         </p:nvSpPr>
         <p:spPr>
           <a:xfrm>
-            <a:off x="1228170" y="1709739"/>
-            <a:ext cx="15525572" cy="2852737"/>
+            <a:off x="1228170" y="2696796"/>
+            <a:ext cx="15525572" cy="4499664"/>
           </a:xfrm>
         </p:spPr>
         <p:txBody>
           <a:bodyPr anchor="b"/>
           <a:lstStyle>
             <a:lvl1pPr>
-              <a:defRPr sz="6000"/>
+              <a:defRPr sz="8858"/>
             </a:lvl1pPr>
           </a:lstStyle>
           <a:p>
@@ -885,8 +885,8 @@
         </p:nvSpPr>
         <p:spPr>
           <a:xfrm>
-            <a:off x="1228170" y="4589464"/>
-            <a:ext cx="15525572" cy="1500187"/>
+            <a:off x="1228170" y="7239029"/>
+            <a:ext cx="15525572" cy="2366267"/>
           </a:xfrm>
         </p:spPr>
         <p:txBody>
@@ -894,7 +894,7 @@
           <a:lstStyle>
             <a:lvl1pPr marL="0" indent="0">
               <a:buNone/>
-              <a:defRPr sz="2400">
+              <a:defRPr sz="3543">
                 <a:solidFill>
                   <a:schemeClr val="tx1">
                     <a:tint val="75000"/>
@@ -902,9 +902,9 @@
                 </a:solidFill>
               </a:defRPr>
             </a:lvl1pPr>
-            <a:lvl2pPr marL="457200" indent="0">
-              <a:buNone/>
-              <a:defRPr sz="2000">
+            <a:lvl2pPr marL="675010" indent="0">
+              <a:buNone/>
+              <a:defRPr sz="2953">
                 <a:solidFill>
                   <a:schemeClr val="tx1">
                     <a:tint val="75000"/>
@@ -912,9 +912,9 @@
                 </a:solidFill>
               </a:defRPr>
             </a:lvl2pPr>
-            <a:lvl3pPr marL="914400" indent="0">
-              <a:buNone/>
-              <a:defRPr sz="1800">
+            <a:lvl3pPr marL="1350020" indent="0">
+              <a:buNone/>
+              <a:defRPr sz="2658">
                 <a:solidFill>
                   <a:schemeClr val="tx1">
                     <a:tint val="75000"/>
@@ -922,9 +922,9 @@
                 </a:solidFill>
               </a:defRPr>
             </a:lvl3pPr>
-            <a:lvl4pPr marL="1371600" indent="0">
-              <a:buNone/>
-              <a:defRPr sz="1600">
+            <a:lvl4pPr marL="2025030" indent="0">
+              <a:buNone/>
+              <a:defRPr sz="2362">
                 <a:solidFill>
                   <a:schemeClr val="tx1">
                     <a:tint val="75000"/>
@@ -932,9 +932,9 @@
                 </a:solidFill>
               </a:defRPr>
             </a:lvl4pPr>
-            <a:lvl5pPr marL="1828800" indent="0">
-              <a:buNone/>
-              <a:defRPr sz="1600">
+            <a:lvl5pPr marL="2700040" indent="0">
+              <a:buNone/>
+              <a:defRPr sz="2362">
                 <a:solidFill>
                   <a:schemeClr val="tx1">
                     <a:tint val="75000"/>
@@ -942,9 +942,9 @@
                 </a:solidFill>
               </a:defRPr>
             </a:lvl5pPr>
-            <a:lvl6pPr marL="2286000" indent="0">
-              <a:buNone/>
-              <a:defRPr sz="1600">
+            <a:lvl6pPr marL="3375050" indent="0">
+              <a:buNone/>
+              <a:defRPr sz="2362">
                 <a:solidFill>
                   <a:schemeClr val="tx1">
                     <a:tint val="75000"/>
@@ -952,9 +952,9 @@
                 </a:solidFill>
               </a:defRPr>
             </a:lvl6pPr>
-            <a:lvl7pPr marL="2743200" indent="0">
-              <a:buNone/>
-              <a:defRPr sz="1600">
+            <a:lvl7pPr marL="4050060" indent="0">
+              <a:buNone/>
+              <a:defRPr sz="2362">
                 <a:solidFill>
                   <a:schemeClr val="tx1">
                     <a:tint val="75000"/>
@@ -962,9 +962,9 @@
                 </a:solidFill>
               </a:defRPr>
             </a:lvl7pPr>
-            <a:lvl8pPr marL="3200400" indent="0">
-              <a:buNone/>
-              <a:defRPr sz="1600">
+            <a:lvl8pPr marL="4725071" indent="0">
+              <a:buNone/>
+              <a:defRPr sz="2362">
                 <a:solidFill>
                   <a:schemeClr val="tx1">
                     <a:tint val="75000"/>
@@ -972,9 +972,9 @@
                 </a:solidFill>
               </a:defRPr>
             </a:lvl8pPr>
-            <a:lvl9pPr marL="3657600" indent="0">
-              <a:buNone/>
-              <a:defRPr sz="1600">
+            <a:lvl9pPr marL="5400081" indent="0">
+              <a:buNone/>
+              <a:defRPr sz="2362">
                 <a:solidFill>
                   <a:schemeClr val="tx1">
                     <a:tint val="75000"/>
@@ -1009,7 +1009,7 @@
           <a:p>
             <a:fld id="{542F47FF-5056-41FF-A1F8-23A414798AA4}" type="datetimeFigureOut">
               <a:rPr lang="en-SG" smtClean="0"/>
-              <a:t>27/3/2018</a:t>
+              <a:t>9/4/2018</a:t>
             </a:fld>
             <a:endParaRPr lang="en-SG"/>
           </a:p>
@@ -1060,7 +1060,7 @@
     </p:spTree>
     <p:extLst>
       <p:ext uri="{BB962C8B-B14F-4D97-AF65-F5344CB8AC3E}">
-        <p14:creationId xmlns:p14="http://schemas.microsoft.com/office/powerpoint/2010/main" val="380896758"/>
+        <p14:creationId xmlns:p14="http://schemas.microsoft.com/office/powerpoint/2010/main" val="1952513679"/>
       </p:ext>
     </p:extLst>
   </p:cSld>
@@ -1122,8 +1122,8 @@
         </p:nvSpPr>
         <p:spPr>
           <a:xfrm>
-            <a:off x="1237545" y="1825625"/>
-            <a:ext cx="7650282" cy="4351338"/>
+            <a:off x="1237545" y="2879585"/>
+            <a:ext cx="7650282" cy="6863430"/>
           </a:xfrm>
         </p:spPr>
         <p:txBody>
@@ -1179,8 +1179,8 @@
         </p:nvSpPr>
         <p:spPr>
           <a:xfrm>
-            <a:off x="9112836" y="1825625"/>
-            <a:ext cx="7650282" cy="4351338"/>
+            <a:off x="9112836" y="2879585"/>
+            <a:ext cx="7650282" cy="6863430"/>
           </a:xfrm>
         </p:spPr>
         <p:txBody>
@@ -1241,7 +1241,7 @@
           <a:p>
             <a:fld id="{542F47FF-5056-41FF-A1F8-23A414798AA4}" type="datetimeFigureOut">
               <a:rPr lang="en-SG" smtClean="0"/>
-              <a:t>27/3/2018</a:t>
+              <a:t>9/4/2018</a:t>
             </a:fld>
             <a:endParaRPr lang="en-SG"/>
           </a:p>
@@ -1292,7 +1292,7 @@
     </p:spTree>
     <p:extLst>
       <p:ext uri="{BB962C8B-B14F-4D97-AF65-F5344CB8AC3E}">
-        <p14:creationId xmlns:p14="http://schemas.microsoft.com/office/powerpoint/2010/main" val="584682865"/>
+        <p14:creationId xmlns:p14="http://schemas.microsoft.com/office/powerpoint/2010/main" val="3780466141"/>
       </p:ext>
     </p:extLst>
   </p:cSld>
@@ -1331,8 +1331,8 @@
         </p:nvSpPr>
         <p:spPr>
           <a:xfrm>
-            <a:off x="1239890" y="365126"/>
-            <a:ext cx="15525572" cy="1325563"/>
+            <a:off x="1239890" y="575918"/>
+            <a:ext cx="15525572" cy="2090830"/>
           </a:xfrm>
         </p:spPr>
         <p:txBody>
@@ -1359,8 +1359,8 @@
         </p:nvSpPr>
         <p:spPr>
           <a:xfrm>
-            <a:off x="1239891" y="1681163"/>
-            <a:ext cx="7615123" cy="823912"/>
+            <a:off x="1239891" y="2651723"/>
+            <a:ext cx="7615123" cy="1299569"/>
           </a:xfrm>
         </p:spPr>
         <p:txBody>
@@ -1368,39 +1368,39 @@
           <a:lstStyle>
             <a:lvl1pPr marL="0" indent="0">
               <a:buNone/>
-              <a:defRPr sz="2400" b="1"/>
+              <a:defRPr sz="3543" b="1"/>
             </a:lvl1pPr>
-            <a:lvl2pPr marL="457200" indent="0">
-              <a:buNone/>
-              <a:defRPr sz="2000" b="1"/>
+            <a:lvl2pPr marL="675010" indent="0">
+              <a:buNone/>
+              <a:defRPr sz="2953" b="1"/>
             </a:lvl2pPr>
-            <a:lvl3pPr marL="914400" indent="0">
-              <a:buNone/>
-              <a:defRPr sz="1800" b="1"/>
+            <a:lvl3pPr marL="1350020" indent="0">
+              <a:buNone/>
+              <a:defRPr sz="2658" b="1"/>
             </a:lvl3pPr>
-            <a:lvl4pPr marL="1371600" indent="0">
-              <a:buNone/>
-              <a:defRPr sz="1600" b="1"/>
+            <a:lvl4pPr marL="2025030" indent="0">
+              <a:buNone/>
+              <a:defRPr sz="2362" b="1"/>
             </a:lvl4pPr>
-            <a:lvl5pPr marL="1828800" indent="0">
-              <a:buNone/>
-              <a:defRPr sz="1600" b="1"/>
+            <a:lvl5pPr marL="2700040" indent="0">
+              <a:buNone/>
+              <a:defRPr sz="2362" b="1"/>
             </a:lvl5pPr>
-            <a:lvl6pPr marL="2286000" indent="0">
-              <a:buNone/>
-              <a:defRPr sz="1600" b="1"/>
+            <a:lvl6pPr marL="3375050" indent="0">
+              <a:buNone/>
+              <a:defRPr sz="2362" b="1"/>
             </a:lvl6pPr>
-            <a:lvl7pPr marL="2743200" indent="0">
-              <a:buNone/>
-              <a:defRPr sz="1600" b="1"/>
+            <a:lvl7pPr marL="4050060" indent="0">
+              <a:buNone/>
+              <a:defRPr sz="2362" b="1"/>
             </a:lvl7pPr>
-            <a:lvl8pPr marL="3200400" indent="0">
-              <a:buNone/>
-              <a:defRPr sz="1600" b="1"/>
+            <a:lvl8pPr marL="4725071" indent="0">
+              <a:buNone/>
+              <a:defRPr sz="2362" b="1"/>
             </a:lvl8pPr>
-            <a:lvl9pPr marL="3657600" indent="0">
-              <a:buNone/>
-              <a:defRPr sz="1600" b="1"/>
+            <a:lvl9pPr marL="5400081" indent="0">
+              <a:buNone/>
+              <a:defRPr sz="2362" b="1"/>
             </a:lvl9pPr>
           </a:lstStyle>
           <a:p>
@@ -1424,8 +1424,8 @@
         </p:nvSpPr>
         <p:spPr>
           <a:xfrm>
-            <a:off x="1239891" y="2505075"/>
-            <a:ext cx="7615123" cy="3684588"/>
+            <a:off x="1239891" y="3951292"/>
+            <a:ext cx="7615123" cy="5811755"/>
           </a:xfrm>
         </p:spPr>
         <p:txBody>
@@ -1481,8 +1481,8 @@
         </p:nvSpPr>
         <p:spPr>
           <a:xfrm>
-            <a:off x="9112836" y="1681163"/>
-            <a:ext cx="7652626" cy="823912"/>
+            <a:off x="9112836" y="2651723"/>
+            <a:ext cx="7652626" cy="1299569"/>
           </a:xfrm>
         </p:spPr>
         <p:txBody>
@@ -1490,39 +1490,39 @@
           <a:lstStyle>
             <a:lvl1pPr marL="0" indent="0">
               <a:buNone/>
-              <a:defRPr sz="2400" b="1"/>
+              <a:defRPr sz="3543" b="1"/>
             </a:lvl1pPr>
-            <a:lvl2pPr marL="457200" indent="0">
-              <a:buNone/>
-              <a:defRPr sz="2000" b="1"/>
+            <a:lvl2pPr marL="675010" indent="0">
+              <a:buNone/>
+              <a:defRPr sz="2953" b="1"/>
             </a:lvl2pPr>
-            <a:lvl3pPr marL="914400" indent="0">
-              <a:buNone/>
-              <a:defRPr sz="1800" b="1"/>
+            <a:lvl3pPr marL="1350020" indent="0">
+              <a:buNone/>
+              <a:defRPr sz="2658" b="1"/>
             </a:lvl3pPr>
-            <a:lvl4pPr marL="1371600" indent="0">
-              <a:buNone/>
-              <a:defRPr sz="1600" b="1"/>
+            <a:lvl4pPr marL="2025030" indent="0">
+              <a:buNone/>
+              <a:defRPr sz="2362" b="1"/>
             </a:lvl4pPr>
-            <a:lvl5pPr marL="1828800" indent="0">
-              <a:buNone/>
-              <a:defRPr sz="1600" b="1"/>
+            <a:lvl5pPr marL="2700040" indent="0">
+              <a:buNone/>
+              <a:defRPr sz="2362" b="1"/>
             </a:lvl5pPr>
-            <a:lvl6pPr marL="2286000" indent="0">
-              <a:buNone/>
-              <a:defRPr sz="1600" b="1"/>
+            <a:lvl6pPr marL="3375050" indent="0">
+              <a:buNone/>
+              <a:defRPr sz="2362" b="1"/>
             </a:lvl6pPr>
-            <a:lvl7pPr marL="2743200" indent="0">
-              <a:buNone/>
-              <a:defRPr sz="1600" b="1"/>
+            <a:lvl7pPr marL="4050060" indent="0">
+              <a:buNone/>
+              <a:defRPr sz="2362" b="1"/>
             </a:lvl7pPr>
-            <a:lvl8pPr marL="3200400" indent="0">
-              <a:buNone/>
-              <a:defRPr sz="1600" b="1"/>
+            <a:lvl8pPr marL="4725071" indent="0">
+              <a:buNone/>
+              <a:defRPr sz="2362" b="1"/>
             </a:lvl8pPr>
-            <a:lvl9pPr marL="3657600" indent="0">
-              <a:buNone/>
-              <a:defRPr sz="1600" b="1"/>
+            <a:lvl9pPr marL="5400081" indent="0">
+              <a:buNone/>
+              <a:defRPr sz="2362" b="1"/>
             </a:lvl9pPr>
           </a:lstStyle>
           <a:p>
@@ -1546,8 +1546,8 @@
         </p:nvSpPr>
         <p:spPr>
           <a:xfrm>
-            <a:off x="9112836" y="2505075"/>
-            <a:ext cx="7652626" cy="3684588"/>
+            <a:off x="9112836" y="3951292"/>
+            <a:ext cx="7652626" cy="5811755"/>
           </a:xfrm>
         </p:spPr>
         <p:txBody>
@@ -1608,7 +1608,7 @@
           <a:p>
             <a:fld id="{542F47FF-5056-41FF-A1F8-23A414798AA4}" type="datetimeFigureOut">
               <a:rPr lang="en-SG" smtClean="0"/>
-              <a:t>27/3/2018</a:t>
+              <a:t>9/4/2018</a:t>
             </a:fld>
             <a:endParaRPr lang="en-SG"/>
           </a:p>
@@ -1659,7 +1659,7 @@
     </p:spTree>
     <p:extLst>
       <p:ext uri="{BB962C8B-B14F-4D97-AF65-F5344CB8AC3E}">
-        <p14:creationId xmlns:p14="http://schemas.microsoft.com/office/powerpoint/2010/main" val="911761864"/>
+        <p14:creationId xmlns:p14="http://schemas.microsoft.com/office/powerpoint/2010/main" val="2377415545"/>
       </p:ext>
     </p:extLst>
   </p:cSld>
@@ -1726,7 +1726,7 @@
           <a:p>
             <a:fld id="{542F47FF-5056-41FF-A1F8-23A414798AA4}" type="datetimeFigureOut">
               <a:rPr lang="en-SG" smtClean="0"/>
-              <a:t>27/3/2018</a:t>
+              <a:t>9/4/2018</a:t>
             </a:fld>
             <a:endParaRPr lang="en-SG"/>
           </a:p>
@@ -1777,7 +1777,7 @@
     </p:spTree>
     <p:extLst>
       <p:ext uri="{BB962C8B-B14F-4D97-AF65-F5344CB8AC3E}">
-        <p14:creationId xmlns:p14="http://schemas.microsoft.com/office/powerpoint/2010/main" val="2693045841"/>
+        <p14:creationId xmlns:p14="http://schemas.microsoft.com/office/powerpoint/2010/main" val="2001562324"/>
       </p:ext>
     </p:extLst>
   </p:cSld>
@@ -1821,7 +1821,7 @@
           <a:p>
             <a:fld id="{542F47FF-5056-41FF-A1F8-23A414798AA4}" type="datetimeFigureOut">
               <a:rPr lang="en-SG" smtClean="0"/>
-              <a:t>27/3/2018</a:t>
+              <a:t>9/4/2018</a:t>
             </a:fld>
             <a:endParaRPr lang="en-SG"/>
           </a:p>
@@ -1872,7 +1872,7 @@
     </p:spTree>
     <p:extLst>
       <p:ext uri="{BB962C8B-B14F-4D97-AF65-F5344CB8AC3E}">
-        <p14:creationId xmlns:p14="http://schemas.microsoft.com/office/powerpoint/2010/main" val="3848292575"/>
+        <p14:creationId xmlns:p14="http://schemas.microsoft.com/office/powerpoint/2010/main" val="1472218268"/>
       </p:ext>
     </p:extLst>
   </p:cSld>
@@ -1911,15 +1911,15 @@
         </p:nvSpPr>
         <p:spPr>
           <a:xfrm>
-            <a:off x="1239891" y="457200"/>
-            <a:ext cx="5805682" cy="1600200"/>
+            <a:off x="1239891" y="721148"/>
+            <a:ext cx="5805682" cy="2524019"/>
           </a:xfrm>
         </p:spPr>
         <p:txBody>
           <a:bodyPr anchor="b"/>
           <a:lstStyle>
             <a:lvl1pPr>
-              <a:defRPr sz="3200"/>
+              <a:defRPr sz="4724"/>
             </a:lvl1pPr>
           </a:lstStyle>
           <a:p>
@@ -1943,39 +1943,39 @@
         </p:nvSpPr>
         <p:spPr>
           <a:xfrm>
-            <a:off x="7652626" y="987426"/>
-            <a:ext cx="9112836" cy="4873625"/>
+            <a:off x="7652626" y="1557481"/>
+            <a:ext cx="9112836" cy="7687241"/>
           </a:xfrm>
         </p:spPr>
         <p:txBody>
           <a:bodyPr/>
           <a:lstStyle>
             <a:lvl1pPr>
-              <a:defRPr sz="3200"/>
+              <a:defRPr sz="4724"/>
             </a:lvl1pPr>
             <a:lvl2pPr>
-              <a:defRPr sz="2800"/>
+              <a:defRPr sz="4134"/>
             </a:lvl2pPr>
             <a:lvl3pPr>
-              <a:defRPr sz="2400"/>
+              <a:defRPr sz="3543"/>
             </a:lvl3pPr>
             <a:lvl4pPr>
-              <a:defRPr sz="2000"/>
+              <a:defRPr sz="2953"/>
             </a:lvl4pPr>
             <a:lvl5pPr>
-              <a:defRPr sz="2000"/>
+              <a:defRPr sz="2953"/>
             </a:lvl5pPr>
             <a:lvl6pPr>
-              <a:defRPr sz="2000"/>
+              <a:defRPr sz="2953"/>
             </a:lvl6pPr>
             <a:lvl7pPr>
-              <a:defRPr sz="2000"/>
+              <a:defRPr sz="2953"/>
             </a:lvl7pPr>
             <a:lvl8pPr>
-              <a:defRPr sz="2000"/>
+              <a:defRPr sz="2953"/>
             </a:lvl8pPr>
             <a:lvl9pPr>
-              <a:defRPr sz="2000"/>
+              <a:defRPr sz="2953"/>
             </a:lvl9pPr>
           </a:lstStyle>
           <a:p>
@@ -2028,8 +2028,8 @@
         </p:nvSpPr>
         <p:spPr>
           <a:xfrm>
-            <a:off x="1239891" y="2057400"/>
-            <a:ext cx="5805682" cy="3811588"/>
+            <a:off x="1239891" y="3245168"/>
+            <a:ext cx="5805682" cy="6012074"/>
           </a:xfrm>
         </p:spPr>
         <p:txBody>
@@ -2037,39 +2037,39 @@
           <a:lstStyle>
             <a:lvl1pPr marL="0" indent="0">
               <a:buNone/>
-              <a:defRPr sz="1600"/>
+              <a:defRPr sz="2362"/>
             </a:lvl1pPr>
-            <a:lvl2pPr marL="457200" indent="0">
-              <a:buNone/>
-              <a:defRPr sz="1400"/>
+            <a:lvl2pPr marL="675010" indent="0">
+              <a:buNone/>
+              <a:defRPr sz="2067"/>
             </a:lvl2pPr>
-            <a:lvl3pPr marL="914400" indent="0">
-              <a:buNone/>
-              <a:defRPr sz="1200"/>
+            <a:lvl3pPr marL="1350020" indent="0">
+              <a:buNone/>
+              <a:defRPr sz="1772"/>
             </a:lvl3pPr>
-            <a:lvl4pPr marL="1371600" indent="0">
-              <a:buNone/>
-              <a:defRPr sz="1000"/>
+            <a:lvl4pPr marL="2025030" indent="0">
+              <a:buNone/>
+              <a:defRPr sz="1476"/>
             </a:lvl4pPr>
-            <a:lvl5pPr marL="1828800" indent="0">
-              <a:buNone/>
-              <a:defRPr sz="1000"/>
+            <a:lvl5pPr marL="2700040" indent="0">
+              <a:buNone/>
+              <a:defRPr sz="1476"/>
             </a:lvl5pPr>
-            <a:lvl6pPr marL="2286000" indent="0">
-              <a:buNone/>
-              <a:defRPr sz="1000"/>
+            <a:lvl6pPr marL="3375050" indent="0">
+              <a:buNone/>
+              <a:defRPr sz="1476"/>
             </a:lvl6pPr>
-            <a:lvl7pPr marL="2743200" indent="0">
-              <a:buNone/>
-              <a:defRPr sz="1000"/>
+            <a:lvl7pPr marL="4050060" indent="0">
+              <a:buNone/>
+              <a:defRPr sz="1476"/>
             </a:lvl7pPr>
-            <a:lvl8pPr marL="3200400" indent="0">
-              <a:buNone/>
-              <a:defRPr sz="1000"/>
+            <a:lvl8pPr marL="4725071" indent="0">
+              <a:buNone/>
+              <a:defRPr sz="1476"/>
             </a:lvl8pPr>
-            <a:lvl9pPr marL="3657600" indent="0">
-              <a:buNone/>
-              <a:defRPr sz="1000"/>
+            <a:lvl9pPr marL="5400081" indent="0">
+              <a:buNone/>
+              <a:defRPr sz="1476"/>
             </a:lvl9pPr>
           </a:lstStyle>
           <a:p>
@@ -2098,7 +2098,7 @@
           <a:p>
             <a:fld id="{542F47FF-5056-41FF-A1F8-23A414798AA4}" type="datetimeFigureOut">
               <a:rPr lang="en-SG" smtClean="0"/>
-              <a:t>27/3/2018</a:t>
+              <a:t>9/4/2018</a:t>
             </a:fld>
             <a:endParaRPr lang="en-SG"/>
           </a:p>
@@ -2149,7 +2149,7 @@
     </p:spTree>
     <p:extLst>
       <p:ext uri="{BB962C8B-B14F-4D97-AF65-F5344CB8AC3E}">
-        <p14:creationId xmlns:p14="http://schemas.microsoft.com/office/powerpoint/2010/main" val="697478462"/>
+        <p14:creationId xmlns:p14="http://schemas.microsoft.com/office/powerpoint/2010/main" val="4041167266"/>
       </p:ext>
     </p:extLst>
   </p:cSld>
@@ -2188,15 +2188,15 @@
         </p:nvSpPr>
         <p:spPr>
           <a:xfrm>
-            <a:off x="1239891" y="457200"/>
-            <a:ext cx="5805682" cy="1600200"/>
+            <a:off x="1239891" y="721148"/>
+            <a:ext cx="5805682" cy="2524019"/>
           </a:xfrm>
         </p:spPr>
         <p:txBody>
           <a:bodyPr anchor="b"/>
           <a:lstStyle>
             <a:lvl1pPr>
-              <a:defRPr sz="3200"/>
+              <a:defRPr sz="4724"/>
             </a:lvl1pPr>
           </a:lstStyle>
           <a:p>
@@ -2220,8 +2220,8 @@
         </p:nvSpPr>
         <p:spPr>
           <a:xfrm>
-            <a:off x="7652626" y="987426"/>
-            <a:ext cx="9112836" cy="4873625"/>
+            <a:off x="7652626" y="1557481"/>
+            <a:ext cx="9112836" cy="7687241"/>
           </a:xfrm>
         </p:spPr>
         <p:txBody>
@@ -2229,39 +2229,39 @@
           <a:lstStyle>
             <a:lvl1pPr marL="0" indent="0">
               <a:buNone/>
-              <a:defRPr sz="3200"/>
+              <a:defRPr sz="4724"/>
             </a:lvl1pPr>
-            <a:lvl2pPr marL="457200" indent="0">
-              <a:buNone/>
-              <a:defRPr sz="2800"/>
+            <a:lvl2pPr marL="675010" indent="0">
+              <a:buNone/>
+              <a:defRPr sz="4134"/>
             </a:lvl2pPr>
-            <a:lvl3pPr marL="914400" indent="0">
-              <a:buNone/>
-              <a:defRPr sz="2400"/>
+            <a:lvl3pPr marL="1350020" indent="0">
+              <a:buNone/>
+              <a:defRPr sz="3543"/>
             </a:lvl3pPr>
-            <a:lvl4pPr marL="1371600" indent="0">
-              <a:buNone/>
-              <a:defRPr sz="2000"/>
+            <a:lvl4pPr marL="2025030" indent="0">
+              <a:buNone/>
+              <a:defRPr sz="2953"/>
             </a:lvl4pPr>
-            <a:lvl5pPr marL="1828800" indent="0">
-              <a:buNone/>
-              <a:defRPr sz="2000"/>
+            <a:lvl5pPr marL="2700040" indent="0">
+              <a:buNone/>
+              <a:defRPr sz="2953"/>
             </a:lvl5pPr>
-            <a:lvl6pPr marL="2286000" indent="0">
-              <a:buNone/>
-              <a:defRPr sz="2000"/>
+            <a:lvl6pPr marL="3375050" indent="0">
+              <a:buNone/>
+              <a:defRPr sz="2953"/>
             </a:lvl6pPr>
-            <a:lvl7pPr marL="2743200" indent="0">
-              <a:buNone/>
-              <a:defRPr sz="2000"/>
+            <a:lvl7pPr marL="4050060" indent="0">
+              <a:buNone/>
+              <a:defRPr sz="2953"/>
             </a:lvl7pPr>
-            <a:lvl8pPr marL="3200400" indent="0">
-              <a:buNone/>
-              <a:defRPr sz="2000"/>
+            <a:lvl8pPr marL="4725071" indent="0">
+              <a:buNone/>
+              <a:defRPr sz="2953"/>
             </a:lvl8pPr>
-            <a:lvl9pPr marL="3657600" indent="0">
-              <a:buNone/>
-              <a:defRPr sz="2000"/>
+            <a:lvl9pPr marL="5400081" indent="0">
+              <a:buNone/>
+              <a:defRPr sz="2953"/>
             </a:lvl9pPr>
           </a:lstStyle>
           <a:p>
@@ -2285,8 +2285,8 @@
         </p:nvSpPr>
         <p:spPr>
           <a:xfrm>
-            <a:off x="1239891" y="2057400"/>
-            <a:ext cx="5805682" cy="3811588"/>
+            <a:off x="1239891" y="3245168"/>
+            <a:ext cx="5805682" cy="6012074"/>
           </a:xfrm>
         </p:spPr>
         <p:txBody>
@@ -2294,39 +2294,39 @@
           <a:lstStyle>
             <a:lvl1pPr marL="0" indent="0">
               <a:buNone/>
-              <a:defRPr sz="1600"/>
+              <a:defRPr sz="2362"/>
             </a:lvl1pPr>
-            <a:lvl2pPr marL="457200" indent="0">
-              <a:buNone/>
-              <a:defRPr sz="1400"/>
+            <a:lvl2pPr marL="675010" indent="0">
+              <a:buNone/>
+              <a:defRPr sz="2067"/>
             </a:lvl2pPr>
-            <a:lvl3pPr marL="914400" indent="0">
-              <a:buNone/>
-              <a:defRPr sz="1200"/>
+            <a:lvl3pPr marL="1350020" indent="0">
+              <a:buNone/>
+              <a:defRPr sz="1772"/>
             </a:lvl3pPr>
-            <a:lvl4pPr marL="1371600" indent="0">
-              <a:buNone/>
-              <a:defRPr sz="1000"/>
+            <a:lvl4pPr marL="2025030" indent="0">
+              <a:buNone/>
+              <a:defRPr sz="1476"/>
             </a:lvl4pPr>
-            <a:lvl5pPr marL="1828800" indent="0">
-              <a:buNone/>
-              <a:defRPr sz="1000"/>
+            <a:lvl5pPr marL="2700040" indent="0">
+              <a:buNone/>
+              <a:defRPr sz="1476"/>
             </a:lvl5pPr>
-            <a:lvl6pPr marL="2286000" indent="0">
-              <a:buNone/>
-              <a:defRPr sz="1000"/>
+            <a:lvl6pPr marL="3375050" indent="0">
+              <a:buNone/>
+              <a:defRPr sz="1476"/>
             </a:lvl6pPr>
-            <a:lvl7pPr marL="2743200" indent="0">
-              <a:buNone/>
-              <a:defRPr sz="1000"/>
+            <a:lvl7pPr marL="4050060" indent="0">
+              <a:buNone/>
+              <a:defRPr sz="1476"/>
             </a:lvl7pPr>
-            <a:lvl8pPr marL="3200400" indent="0">
-              <a:buNone/>
-              <a:defRPr sz="1000"/>
+            <a:lvl8pPr marL="4725071" indent="0">
+              <a:buNone/>
+              <a:defRPr sz="1476"/>
             </a:lvl8pPr>
-            <a:lvl9pPr marL="3657600" indent="0">
-              <a:buNone/>
-              <a:defRPr sz="1000"/>
+            <a:lvl9pPr marL="5400081" indent="0">
+              <a:buNone/>
+              <a:defRPr sz="1476"/>
             </a:lvl9pPr>
           </a:lstStyle>
           <a:p>
@@ -2355,7 +2355,7 @@
           <a:p>
             <a:fld id="{542F47FF-5056-41FF-A1F8-23A414798AA4}" type="datetimeFigureOut">
               <a:rPr lang="en-SG" smtClean="0"/>
-              <a:t>27/3/2018</a:t>
+              <a:t>9/4/2018</a:t>
             </a:fld>
             <a:endParaRPr lang="en-SG"/>
           </a:p>
@@ -2406,7 +2406,7 @@
     </p:spTree>
     <p:extLst>
       <p:ext uri="{BB962C8B-B14F-4D97-AF65-F5344CB8AC3E}">
-        <p14:creationId xmlns:p14="http://schemas.microsoft.com/office/powerpoint/2010/main" val="1180213673"/>
+        <p14:creationId xmlns:p14="http://schemas.microsoft.com/office/powerpoint/2010/main" val="327838484"/>
       </p:ext>
     </p:extLst>
   </p:cSld>
@@ -2450,8 +2450,8 @@
         </p:nvSpPr>
         <p:spPr>
           <a:xfrm>
-            <a:off x="1237546" y="365126"/>
-            <a:ext cx="15525572" cy="1325563"/>
+            <a:off x="1237546" y="575918"/>
+            <a:ext cx="15525572" cy="2090830"/>
           </a:xfrm>
           <a:prstGeom prst="rect">
             <a:avLst/>
@@ -2483,8 +2483,8 @@
         </p:nvSpPr>
         <p:spPr>
           <a:xfrm>
-            <a:off x="1237546" y="1825625"/>
-            <a:ext cx="15525572" cy="4351338"/>
+            <a:off x="1237546" y="2879585"/>
+            <a:ext cx="15525572" cy="6863430"/>
           </a:xfrm>
           <a:prstGeom prst="rect">
             <a:avLst/>
@@ -2545,8 +2545,8 @@
         </p:nvSpPr>
         <p:spPr>
           <a:xfrm>
-            <a:off x="1237546" y="6356351"/>
-            <a:ext cx="4050149" cy="365125"/>
+            <a:off x="1237546" y="10025966"/>
+            <a:ext cx="4050149" cy="575917"/>
           </a:xfrm>
           <a:prstGeom prst="rect">
             <a:avLst/>
@@ -2556,7 +2556,7 @@
           <a:bodyPr vert="horz" lIns="91440" tIns="45720" rIns="91440" bIns="45720" rtlCol="0" anchor="ctr"/>
           <a:lstStyle>
             <a:lvl1pPr algn="l">
-              <a:defRPr sz="1200">
+              <a:defRPr sz="1772">
                 <a:solidFill>
                   <a:schemeClr val="tx1">
                     <a:tint val="75000"/>
@@ -2568,7 +2568,7 @@
           <a:p>
             <a:fld id="{542F47FF-5056-41FF-A1F8-23A414798AA4}" type="datetimeFigureOut">
               <a:rPr lang="en-SG" smtClean="0"/>
-              <a:t>27/3/2018</a:t>
+              <a:t>9/4/2018</a:t>
             </a:fld>
             <a:endParaRPr lang="en-SG"/>
           </a:p>
@@ -2586,8 +2586,8 @@
         </p:nvSpPr>
         <p:spPr>
           <a:xfrm>
-            <a:off x="5962720" y="6356351"/>
-            <a:ext cx="6075224" cy="365125"/>
+            <a:off x="5962720" y="10025966"/>
+            <a:ext cx="6075224" cy="575917"/>
           </a:xfrm>
           <a:prstGeom prst="rect">
             <a:avLst/>
@@ -2597,7 +2597,7 @@
           <a:bodyPr vert="horz" lIns="91440" tIns="45720" rIns="91440" bIns="45720" rtlCol="0" anchor="ctr"/>
           <a:lstStyle>
             <a:lvl1pPr algn="ctr">
-              <a:defRPr sz="1200">
+              <a:defRPr sz="1772">
                 <a:solidFill>
                   <a:schemeClr val="tx1">
                     <a:tint val="75000"/>
@@ -2623,8 +2623,8 @@
         </p:nvSpPr>
         <p:spPr>
           <a:xfrm>
-            <a:off x="12712968" y="6356351"/>
-            <a:ext cx="4050149" cy="365125"/>
+            <a:off x="12712968" y="10025966"/>
+            <a:ext cx="4050149" cy="575917"/>
           </a:xfrm>
           <a:prstGeom prst="rect">
             <a:avLst/>
@@ -2634,7 +2634,7 @@
           <a:bodyPr vert="horz" lIns="91440" tIns="45720" rIns="91440" bIns="45720" rtlCol="0" anchor="ctr"/>
           <a:lstStyle>
             <a:lvl1pPr algn="r">
-              <a:defRPr sz="1200">
+              <a:defRPr sz="1772">
                 <a:solidFill>
                   <a:schemeClr val="tx1">
                     <a:tint val="75000"/>
@@ -2655,27 +2655,27 @@
     </p:spTree>
     <p:extLst>
       <p:ext uri="{BB962C8B-B14F-4D97-AF65-F5344CB8AC3E}">
-        <p14:creationId xmlns:p14="http://schemas.microsoft.com/office/powerpoint/2010/main" val="3452382542"/>
+        <p14:creationId xmlns:p14="http://schemas.microsoft.com/office/powerpoint/2010/main" val="3974169039"/>
       </p:ext>
     </p:extLst>
   </p:cSld>
   <p:clrMap bg1="lt1" tx1="dk1" bg2="lt2" tx2="dk2" accent1="accent1" accent2="accent2" accent3="accent3" accent4="accent4" accent5="accent5" accent6="accent6" hlink="hlink" folHlink="folHlink"/>
   <p:sldLayoutIdLst>
-    <p:sldLayoutId id="2147483661" r:id="rId1"/>
-    <p:sldLayoutId id="2147483662" r:id="rId2"/>
-    <p:sldLayoutId id="2147483663" r:id="rId3"/>
-    <p:sldLayoutId id="2147483664" r:id="rId4"/>
-    <p:sldLayoutId id="2147483665" r:id="rId5"/>
-    <p:sldLayoutId id="2147483666" r:id="rId6"/>
-    <p:sldLayoutId id="2147483667" r:id="rId7"/>
-    <p:sldLayoutId id="2147483668" r:id="rId8"/>
-    <p:sldLayoutId id="2147483669" r:id="rId9"/>
-    <p:sldLayoutId id="2147483670" r:id="rId10"/>
-    <p:sldLayoutId id="2147483671" r:id="rId11"/>
+    <p:sldLayoutId id="2147483673" r:id="rId1"/>
+    <p:sldLayoutId id="2147483674" r:id="rId2"/>
+    <p:sldLayoutId id="2147483675" r:id="rId3"/>
+    <p:sldLayoutId id="2147483676" r:id="rId4"/>
+    <p:sldLayoutId id="2147483677" r:id="rId5"/>
+    <p:sldLayoutId id="2147483678" r:id="rId6"/>
+    <p:sldLayoutId id="2147483679" r:id="rId7"/>
+    <p:sldLayoutId id="2147483680" r:id="rId8"/>
+    <p:sldLayoutId id="2147483681" r:id="rId9"/>
+    <p:sldLayoutId id="2147483682" r:id="rId10"/>
+    <p:sldLayoutId id="2147483683" r:id="rId11"/>
   </p:sldLayoutIdLst>
   <p:txStyles>
     <p:titleStyle>
-      <a:lvl1pPr algn="l" defTabSz="914400" rtl="0" eaLnBrk="1" latinLnBrk="0" hangingPunct="1">
+      <a:lvl1pPr algn="l" defTabSz="1350020" rtl="0" eaLnBrk="1" latinLnBrk="0" hangingPunct="1">
         <a:lnSpc>
           <a:spcPct val="90000"/>
         </a:lnSpc>
@@ -2683,7 +2683,7 @@
           <a:spcPct val="0"/>
         </a:spcBef>
         <a:buNone/>
-        <a:defRPr sz="4400" kern="1200">
+        <a:defRPr sz="6496" kern="1200">
           <a:solidFill>
             <a:schemeClr val="tx1"/>
           </a:solidFill>
@@ -2694,16 +2694,16 @@
       </a:lvl1pPr>
     </p:titleStyle>
     <p:bodyStyle>
-      <a:lvl1pPr marL="228600" indent="-228600" algn="l" defTabSz="914400" rtl="0" eaLnBrk="1" latinLnBrk="0" hangingPunct="1">
+      <a:lvl1pPr marL="337505" indent="-337505" algn="l" defTabSz="1350020" rtl="0" eaLnBrk="1" latinLnBrk="0" hangingPunct="1">
         <a:lnSpc>
           <a:spcPct val="90000"/>
         </a:lnSpc>
         <a:spcBef>
-          <a:spcPts val="1000"/>
+          <a:spcPts val="1476"/>
         </a:spcBef>
         <a:buFont typeface="Arial" panose="020B0604020202020204" pitchFamily="34" charset="0"/>
         <a:buChar char="•"/>
-        <a:defRPr sz="2800" kern="1200">
+        <a:defRPr sz="4134" kern="1200">
           <a:solidFill>
             <a:schemeClr val="tx1"/>
           </a:solidFill>
@@ -2712,16 +2712,16 @@
           <a:cs typeface="+mn-cs"/>
         </a:defRPr>
       </a:lvl1pPr>
-      <a:lvl2pPr marL="685800" indent="-228600" algn="l" defTabSz="914400" rtl="0" eaLnBrk="1" latinLnBrk="0" hangingPunct="1">
+      <a:lvl2pPr marL="1012515" indent="-337505" algn="l" defTabSz="1350020" rtl="0" eaLnBrk="1" latinLnBrk="0" hangingPunct="1">
         <a:lnSpc>
           <a:spcPct val="90000"/>
         </a:lnSpc>
         <a:spcBef>
-          <a:spcPts val="500"/>
+          <a:spcPts val="738"/>
         </a:spcBef>
         <a:buFont typeface="Arial" panose="020B0604020202020204" pitchFamily="34" charset="0"/>
         <a:buChar char="•"/>
-        <a:defRPr sz="2400" kern="1200">
+        <a:defRPr sz="3543" kern="1200">
           <a:solidFill>
             <a:schemeClr val="tx1"/>
           </a:solidFill>
@@ -2730,16 +2730,16 @@
           <a:cs typeface="+mn-cs"/>
         </a:defRPr>
       </a:lvl2pPr>
-      <a:lvl3pPr marL="1143000" indent="-228600" algn="l" defTabSz="914400" rtl="0" eaLnBrk="1" latinLnBrk="0" hangingPunct="1">
+      <a:lvl3pPr marL="1687525" indent="-337505" algn="l" defTabSz="1350020" rtl="0" eaLnBrk="1" latinLnBrk="0" hangingPunct="1">
         <a:lnSpc>
           <a:spcPct val="90000"/>
         </a:lnSpc>
         <a:spcBef>
-          <a:spcPts val="500"/>
+          <a:spcPts val="738"/>
         </a:spcBef>
         <a:buFont typeface="Arial" panose="020B0604020202020204" pitchFamily="34" charset="0"/>
         <a:buChar char="•"/>
-        <a:defRPr sz="2000" kern="1200">
+        <a:defRPr sz="2953" kern="1200">
           <a:solidFill>
             <a:schemeClr val="tx1"/>
           </a:solidFill>
@@ -2748,16 +2748,16 @@
           <a:cs typeface="+mn-cs"/>
         </a:defRPr>
       </a:lvl3pPr>
-      <a:lvl4pPr marL="1600200" indent="-228600" algn="l" defTabSz="914400" rtl="0" eaLnBrk="1" latinLnBrk="0" hangingPunct="1">
+      <a:lvl4pPr marL="2362535" indent="-337505" algn="l" defTabSz="1350020" rtl="0" eaLnBrk="1" latinLnBrk="0" hangingPunct="1">
         <a:lnSpc>
           <a:spcPct val="90000"/>
         </a:lnSpc>
         <a:spcBef>
-          <a:spcPts val="500"/>
+          <a:spcPts val="738"/>
         </a:spcBef>
         <a:buFont typeface="Arial" panose="020B0604020202020204" pitchFamily="34" charset="0"/>
         <a:buChar char="•"/>
-        <a:defRPr sz="1800" kern="1200">
+        <a:defRPr sz="2658" kern="1200">
           <a:solidFill>
             <a:schemeClr val="tx1"/>
           </a:solidFill>
@@ -2766,16 +2766,16 @@
           <a:cs typeface="+mn-cs"/>
         </a:defRPr>
       </a:lvl4pPr>
-      <a:lvl5pPr marL="2057400" indent="-228600" algn="l" defTabSz="914400" rtl="0" eaLnBrk="1" latinLnBrk="0" hangingPunct="1">
+      <a:lvl5pPr marL="3037545" indent="-337505" algn="l" defTabSz="1350020" rtl="0" eaLnBrk="1" latinLnBrk="0" hangingPunct="1">
         <a:lnSpc>
           <a:spcPct val="90000"/>
         </a:lnSpc>
         <a:spcBef>
-          <a:spcPts val="500"/>
+          <a:spcPts val="738"/>
         </a:spcBef>
         <a:buFont typeface="Arial" panose="020B0604020202020204" pitchFamily="34" charset="0"/>
         <a:buChar char="•"/>
-        <a:defRPr sz="1800" kern="1200">
+        <a:defRPr sz="2658" kern="1200">
           <a:solidFill>
             <a:schemeClr val="tx1"/>
           </a:solidFill>
@@ -2784,16 +2784,16 @@
           <a:cs typeface="+mn-cs"/>
         </a:defRPr>
       </a:lvl5pPr>
-      <a:lvl6pPr marL="2514600" indent="-228600" algn="l" defTabSz="914400" rtl="0" eaLnBrk="1" latinLnBrk="0" hangingPunct="1">
+      <a:lvl6pPr marL="3712555" indent="-337505" algn="l" defTabSz="1350020" rtl="0" eaLnBrk="1" latinLnBrk="0" hangingPunct="1">
         <a:lnSpc>
           <a:spcPct val="90000"/>
         </a:lnSpc>
         <a:spcBef>
-          <a:spcPts val="500"/>
+          <a:spcPts val="738"/>
         </a:spcBef>
         <a:buFont typeface="Arial" panose="020B0604020202020204" pitchFamily="34" charset="0"/>
         <a:buChar char="•"/>
-        <a:defRPr sz="1800" kern="1200">
+        <a:defRPr sz="2658" kern="1200">
           <a:solidFill>
             <a:schemeClr val="tx1"/>
           </a:solidFill>
@@ -2802,16 +2802,16 @@
           <a:cs typeface="+mn-cs"/>
         </a:defRPr>
       </a:lvl6pPr>
-      <a:lvl7pPr marL="2971800" indent="-228600" algn="l" defTabSz="914400" rtl="0" eaLnBrk="1" latinLnBrk="0" hangingPunct="1">
+      <a:lvl7pPr marL="4387566" indent="-337505" algn="l" defTabSz="1350020" rtl="0" eaLnBrk="1" latinLnBrk="0" hangingPunct="1">
         <a:lnSpc>
           <a:spcPct val="90000"/>
         </a:lnSpc>
         <a:spcBef>
-          <a:spcPts val="500"/>
+          <a:spcPts val="738"/>
         </a:spcBef>
         <a:buFont typeface="Arial" panose="020B0604020202020204" pitchFamily="34" charset="0"/>
         <a:buChar char="•"/>
-        <a:defRPr sz="1800" kern="1200">
+        <a:defRPr sz="2658" kern="1200">
           <a:solidFill>
             <a:schemeClr val="tx1"/>
           </a:solidFill>
@@ -2820,16 +2820,16 @@
           <a:cs typeface="+mn-cs"/>
         </a:defRPr>
       </a:lvl7pPr>
-      <a:lvl8pPr marL="3429000" indent="-228600" algn="l" defTabSz="914400" rtl="0" eaLnBrk="1" latinLnBrk="0" hangingPunct="1">
+      <a:lvl8pPr marL="5062576" indent="-337505" algn="l" defTabSz="1350020" rtl="0" eaLnBrk="1" latinLnBrk="0" hangingPunct="1">
         <a:lnSpc>
           <a:spcPct val="90000"/>
         </a:lnSpc>
         <a:spcBef>
-          <a:spcPts val="500"/>
+          <a:spcPts val="738"/>
         </a:spcBef>
         <a:buFont typeface="Arial" panose="020B0604020202020204" pitchFamily="34" charset="0"/>
         <a:buChar char="•"/>
-        <a:defRPr sz="1800" kern="1200">
+        <a:defRPr sz="2658" kern="1200">
           <a:solidFill>
             <a:schemeClr val="tx1"/>
           </a:solidFill>
@@ -2838,16 +2838,16 @@
           <a:cs typeface="+mn-cs"/>
         </a:defRPr>
       </a:lvl8pPr>
-      <a:lvl9pPr marL="3886200" indent="-228600" algn="l" defTabSz="914400" rtl="0" eaLnBrk="1" latinLnBrk="0" hangingPunct="1">
+      <a:lvl9pPr marL="5737586" indent="-337505" algn="l" defTabSz="1350020" rtl="0" eaLnBrk="1" latinLnBrk="0" hangingPunct="1">
         <a:lnSpc>
           <a:spcPct val="90000"/>
         </a:lnSpc>
         <a:spcBef>
-          <a:spcPts val="500"/>
+          <a:spcPts val="738"/>
         </a:spcBef>
         <a:buFont typeface="Arial" panose="020B0604020202020204" pitchFamily="34" charset="0"/>
         <a:buChar char="•"/>
-        <a:defRPr sz="1800" kern="1200">
+        <a:defRPr sz="2658" kern="1200">
           <a:solidFill>
             <a:schemeClr val="tx1"/>
           </a:solidFill>
@@ -2861,8 +2861,8 @@
       <a:defPPr>
         <a:defRPr lang="en-US"/>
       </a:defPPr>
-      <a:lvl1pPr marL="0" algn="l" defTabSz="914400" rtl="0" eaLnBrk="1" latinLnBrk="0" hangingPunct="1">
-        <a:defRPr sz="1800" kern="1200">
+      <a:lvl1pPr marL="0" algn="l" defTabSz="1350020" rtl="0" eaLnBrk="1" latinLnBrk="0" hangingPunct="1">
+        <a:defRPr sz="2658" kern="1200">
           <a:solidFill>
             <a:schemeClr val="tx1"/>
           </a:solidFill>
@@ -2871,8 +2871,8 @@
           <a:cs typeface="+mn-cs"/>
         </a:defRPr>
       </a:lvl1pPr>
-      <a:lvl2pPr marL="457200" algn="l" defTabSz="914400" rtl="0" eaLnBrk="1" latinLnBrk="0" hangingPunct="1">
-        <a:defRPr sz="1800" kern="1200">
+      <a:lvl2pPr marL="675010" algn="l" defTabSz="1350020" rtl="0" eaLnBrk="1" latinLnBrk="0" hangingPunct="1">
+        <a:defRPr sz="2658" kern="1200">
           <a:solidFill>
             <a:schemeClr val="tx1"/>
           </a:solidFill>
@@ -2881,8 +2881,8 @@
           <a:cs typeface="+mn-cs"/>
         </a:defRPr>
       </a:lvl2pPr>
-      <a:lvl3pPr marL="914400" algn="l" defTabSz="914400" rtl="0" eaLnBrk="1" latinLnBrk="0" hangingPunct="1">
-        <a:defRPr sz="1800" kern="1200">
+      <a:lvl3pPr marL="1350020" algn="l" defTabSz="1350020" rtl="0" eaLnBrk="1" latinLnBrk="0" hangingPunct="1">
+        <a:defRPr sz="2658" kern="1200">
           <a:solidFill>
             <a:schemeClr val="tx1"/>
           </a:solidFill>
@@ -2891,8 +2891,8 @@
           <a:cs typeface="+mn-cs"/>
         </a:defRPr>
       </a:lvl3pPr>
-      <a:lvl4pPr marL="1371600" algn="l" defTabSz="914400" rtl="0" eaLnBrk="1" latinLnBrk="0" hangingPunct="1">
-        <a:defRPr sz="1800" kern="1200">
+      <a:lvl4pPr marL="2025030" algn="l" defTabSz="1350020" rtl="0" eaLnBrk="1" latinLnBrk="0" hangingPunct="1">
+        <a:defRPr sz="2658" kern="1200">
           <a:solidFill>
             <a:schemeClr val="tx1"/>
           </a:solidFill>
@@ -2901,8 +2901,8 @@
           <a:cs typeface="+mn-cs"/>
         </a:defRPr>
       </a:lvl4pPr>
-      <a:lvl5pPr marL="1828800" algn="l" defTabSz="914400" rtl="0" eaLnBrk="1" latinLnBrk="0" hangingPunct="1">
-        <a:defRPr sz="1800" kern="1200">
+      <a:lvl5pPr marL="2700040" algn="l" defTabSz="1350020" rtl="0" eaLnBrk="1" latinLnBrk="0" hangingPunct="1">
+        <a:defRPr sz="2658" kern="1200">
           <a:solidFill>
             <a:schemeClr val="tx1"/>
           </a:solidFill>
@@ -2911,8 +2911,8 @@
           <a:cs typeface="+mn-cs"/>
         </a:defRPr>
       </a:lvl5pPr>
-      <a:lvl6pPr marL="2286000" algn="l" defTabSz="914400" rtl="0" eaLnBrk="1" latinLnBrk="0" hangingPunct="1">
-        <a:defRPr sz="1800" kern="1200">
+      <a:lvl6pPr marL="3375050" algn="l" defTabSz="1350020" rtl="0" eaLnBrk="1" latinLnBrk="0" hangingPunct="1">
+        <a:defRPr sz="2658" kern="1200">
           <a:solidFill>
             <a:schemeClr val="tx1"/>
           </a:solidFill>
@@ -2921,8 +2921,8 @@
           <a:cs typeface="+mn-cs"/>
         </a:defRPr>
       </a:lvl6pPr>
-      <a:lvl7pPr marL="2743200" algn="l" defTabSz="914400" rtl="0" eaLnBrk="1" latinLnBrk="0" hangingPunct="1">
-        <a:defRPr sz="1800" kern="1200">
+      <a:lvl7pPr marL="4050060" algn="l" defTabSz="1350020" rtl="0" eaLnBrk="1" latinLnBrk="0" hangingPunct="1">
+        <a:defRPr sz="2658" kern="1200">
           <a:solidFill>
             <a:schemeClr val="tx1"/>
           </a:solidFill>
@@ -2931,8 +2931,8 @@
           <a:cs typeface="+mn-cs"/>
         </a:defRPr>
       </a:lvl7pPr>
-      <a:lvl8pPr marL="3200400" algn="l" defTabSz="914400" rtl="0" eaLnBrk="1" latinLnBrk="0" hangingPunct="1">
-        <a:defRPr sz="1800" kern="1200">
+      <a:lvl8pPr marL="4725071" algn="l" defTabSz="1350020" rtl="0" eaLnBrk="1" latinLnBrk="0" hangingPunct="1">
+        <a:defRPr sz="2658" kern="1200">
           <a:solidFill>
             <a:schemeClr val="tx1"/>
           </a:solidFill>
@@ -2941,8 +2941,8 @@
           <a:cs typeface="+mn-cs"/>
         </a:defRPr>
       </a:lvl8pPr>
-      <a:lvl9pPr marL="3657600" algn="l" defTabSz="914400" rtl="0" eaLnBrk="1" latinLnBrk="0" hangingPunct="1">
-        <a:defRPr sz="1800" kern="1200">
+      <a:lvl9pPr marL="5400081" algn="l" defTabSz="1350020" rtl="0" eaLnBrk="1" latinLnBrk="0" hangingPunct="1">
+        <a:defRPr sz="2658" kern="1200">
           <a:solidFill>
             <a:schemeClr val="tx1"/>
           </a:solidFill>
@@ -2987,7 +2987,7 @@
         </p:nvSpPr>
         <p:spPr>
           <a:xfrm>
-            <a:off x="468661" y="1125324"/>
+            <a:off x="588583" y="1456019"/>
             <a:ext cx="235669" cy="235669"/>
           </a:xfrm>
           <a:prstGeom prst="ellipse">
@@ -3040,7 +3040,7 @@
         </p:nvCxnSpPr>
         <p:spPr>
           <a:xfrm>
-            <a:off x="704330" y="1243159"/>
+            <a:off x="824252" y="1573854"/>
             <a:ext cx="227605" cy="839"/>
           </a:xfrm>
           <a:prstGeom prst="straightConnector1">
@@ -3079,7 +3079,7 @@
         </p:nvSpPr>
         <p:spPr>
           <a:xfrm>
-            <a:off x="931935" y="885779"/>
+            <a:off x="1051857" y="1216474"/>
             <a:ext cx="1570355" cy="716437"/>
           </a:xfrm>
           <a:prstGeom prst="roundRect">
@@ -3134,7 +3134,7 @@
         </p:nvCxnSpPr>
         <p:spPr>
           <a:xfrm flipV="1">
-            <a:off x="2502290" y="1243159"/>
+            <a:off x="2622212" y="1573853"/>
             <a:ext cx="389055" cy="838"/>
           </a:xfrm>
           <a:prstGeom prst="straightConnector1">
@@ -3173,7 +3173,7 @@
         </p:nvSpPr>
         <p:spPr>
           <a:xfrm>
-            <a:off x="2891342" y="1002775"/>
+            <a:off x="3011263" y="1333469"/>
             <a:ext cx="480766" cy="480766"/>
           </a:xfrm>
           <a:prstGeom prst="diamond">
@@ -3222,7 +3222,7 @@
         </p:nvSpPr>
         <p:spPr>
           <a:xfrm>
-            <a:off x="2865248" y="1686217"/>
+            <a:off x="2985169" y="2016911"/>
             <a:ext cx="1346134" cy="369460"/>
           </a:xfrm>
           <a:prstGeom prst="rect">
@@ -3257,7 +3257,7 @@
         </p:nvSpPr>
         <p:spPr>
           <a:xfrm>
-            <a:off x="4457889" y="1445834"/>
+            <a:off x="4388621" y="1793632"/>
             <a:ext cx="480766" cy="480766"/>
           </a:xfrm>
           <a:prstGeom prst="diamond">
@@ -3306,7 +3306,7 @@
         </p:nvSpPr>
         <p:spPr>
           <a:xfrm>
-            <a:off x="6144930" y="4446196"/>
+            <a:off x="6240507" y="7887346"/>
             <a:ext cx="715433" cy="369460"/>
           </a:xfrm>
           <a:prstGeom prst="rect">
@@ -3341,7 +3341,7 @@
         </p:nvSpPr>
         <p:spPr>
           <a:xfrm>
-            <a:off x="6363373" y="1311823"/>
+            <a:off x="6483294" y="1642517"/>
             <a:ext cx="1750714" cy="369460"/>
           </a:xfrm>
           <a:prstGeom prst="rect">
@@ -3376,8 +3376,8 @@
         </p:nvSpPr>
         <p:spPr>
           <a:xfrm>
-            <a:off x="8087751" y="1357998"/>
-            <a:ext cx="1825159" cy="646330"/>
+            <a:off x="8418026" y="1688692"/>
+            <a:ext cx="1990535" cy="646330"/>
           </a:xfrm>
           <a:prstGeom prst="roundRect">
             <a:avLst/>
@@ -3428,7 +3428,7 @@
         </p:nvGrpSpPr>
         <p:grpSpPr>
           <a:xfrm>
-            <a:off x="14209852" y="5527331"/>
+            <a:off x="14409613" y="9797867"/>
             <a:ext cx="235669" cy="235669"/>
             <a:chOff x="8040730" y="5082186"/>
             <a:chExt cx="235669" cy="235669"/>
@@ -3548,8 +3548,8 @@
         </p:nvCxnSpPr>
         <p:spPr>
           <a:xfrm rot="16200000" flipH="1">
-            <a:off x="3693469" y="921797"/>
-            <a:ext cx="202676" cy="1326164"/>
+            <a:off x="3710243" y="1355637"/>
+            <a:ext cx="219780" cy="1136975"/>
           </a:xfrm>
           <a:prstGeom prst="bentConnector2">
             <a:avLst/>
@@ -3585,7 +3585,7 @@
         </p:nvCxnSpPr>
         <p:spPr>
           <a:xfrm rot="5400000" flipH="1" flipV="1">
-            <a:off x="3669728" y="194646"/>
+            <a:off x="3789650" y="525341"/>
             <a:ext cx="270129" cy="1346133"/>
           </a:xfrm>
           <a:prstGeom prst="bentConnector2">
@@ -3624,7 +3624,7 @@
         </p:nvSpPr>
         <p:spPr>
           <a:xfrm>
-            <a:off x="4477858" y="380116"/>
+            <a:off x="4597779" y="710811"/>
             <a:ext cx="1762034" cy="705061"/>
           </a:xfrm>
           <a:prstGeom prst="roundRect">
@@ -3676,7 +3676,7 @@
         </p:nvSpPr>
         <p:spPr>
           <a:xfrm>
-            <a:off x="5897515" y="1445834"/>
+            <a:off x="6017436" y="1776528"/>
             <a:ext cx="480766" cy="480766"/>
           </a:xfrm>
           <a:prstGeom prst="diamond">
@@ -3725,7 +3725,7 @@
         </p:nvSpPr>
         <p:spPr>
           <a:xfrm>
-            <a:off x="4791764" y="1298810"/>
+            <a:off x="4745893" y="1641407"/>
             <a:ext cx="1346134" cy="369460"/>
           </a:xfrm>
           <a:prstGeom prst="rect">
@@ -3741,7 +3741,15 @@
           <a:p>
             <a:r>
               <a:rPr lang="en-SG" sz="1801" dirty="0"/>
-              <a:t>[first time]</a:t>
+              <a:t>[</a:t>
+            </a:r>
+            <a:r>
+              <a:rPr lang="en-SG" sz="1801" dirty="0" err="1"/>
+              <a:t>isFirstTime</a:t>
+            </a:r>
+            <a:r>
+              <a:rPr lang="en-SG" sz="1801" dirty="0"/>
+              <a:t>]</a:t>
             </a:r>
           </a:p>
         </p:txBody>
@@ -3764,8 +3772,8 @@
         </p:nvCxnSpPr>
         <p:spPr>
           <a:xfrm>
-            <a:off x="13346057" y="1681163"/>
-            <a:ext cx="981630" cy="3846168"/>
+            <a:off x="13767844" y="2000808"/>
+            <a:ext cx="759604" cy="7797059"/>
           </a:xfrm>
           <a:prstGeom prst="bentConnector2">
             <a:avLst/>
@@ -3807,8 +3815,8 @@
         </p:nvCxnSpPr>
         <p:spPr>
           <a:xfrm flipV="1">
-            <a:off x="6378281" y="1681163"/>
-            <a:ext cx="1709470" cy="5054"/>
+            <a:off x="6498202" y="2011857"/>
+            <a:ext cx="1919824" cy="5054"/>
           </a:xfrm>
           <a:prstGeom prst="straightConnector1">
             <a:avLst/>
@@ -3846,7 +3854,7 @@
         </p:nvSpPr>
         <p:spPr>
           <a:xfrm>
-            <a:off x="2865249" y="347247"/>
+            <a:off x="2985171" y="677941"/>
             <a:ext cx="1651377" cy="369460"/>
           </a:xfrm>
           <a:prstGeom prst="rect">
@@ -3884,8 +3892,8 @@
         </p:nvCxnSpPr>
         <p:spPr>
           <a:xfrm flipV="1">
-            <a:off x="6149668" y="2508847"/>
-            <a:ext cx="1938083" cy="6516"/>
+            <a:off x="6264945" y="2839541"/>
+            <a:ext cx="2153079" cy="20976"/>
           </a:xfrm>
           <a:prstGeom prst="straightConnector1">
             <a:avLst/>
@@ -3923,7 +3931,7 @@
         </p:nvSpPr>
         <p:spPr>
           <a:xfrm>
-            <a:off x="6166734" y="2160362"/>
+            <a:off x="6286655" y="2491056"/>
             <a:ext cx="1775130" cy="369460"/>
           </a:xfrm>
           <a:prstGeom prst="rect">
@@ -3958,8 +3966,8 @@
         </p:nvSpPr>
         <p:spPr>
           <a:xfrm>
-            <a:off x="6166734" y="2923182"/>
-            <a:ext cx="1965831" cy="369460"/>
+            <a:off x="6286656" y="3253876"/>
+            <a:ext cx="2153081" cy="369460"/>
           </a:xfrm>
           <a:prstGeom prst="rect">
             <a:avLst/>
@@ -3974,7 +3982,7 @@
           <a:p>
             <a:r>
               <a:rPr lang="en-SG" sz="1801" dirty="0"/>
-              <a:t>[Delete command]</a:t>
+              <a:t>[Remark command]</a:t>
             </a:r>
           </a:p>
         </p:txBody>
@@ -3993,7 +4001,7 @@
         </p:nvSpPr>
         <p:spPr>
           <a:xfrm>
-            <a:off x="6149668" y="3673302"/>
+            <a:off x="6269590" y="4003996"/>
             <a:ext cx="1953083" cy="369460"/>
           </a:xfrm>
           <a:prstGeom prst="rect">
@@ -4009,7 +4017,7 @@
           <a:p>
             <a:r>
               <a:rPr lang="en-SG" sz="1801" dirty="0"/>
-              <a:t>[Select command]</a:t>
+              <a:t>[Rate command]</a:t>
             </a:r>
           </a:p>
         </p:txBody>
@@ -4030,9 +4038,9 @@
           <p:nvPr/>
         </p:nvCxnSpPr>
         <p:spPr>
-          <a:xfrm>
-            <a:off x="6149668" y="3276054"/>
-            <a:ext cx="1941550" cy="0"/>
+          <a:xfrm flipV="1">
+            <a:off x="6277783" y="3606748"/>
+            <a:ext cx="2143710" cy="16588"/>
           </a:xfrm>
           <a:prstGeom prst="straightConnector1">
             <a:avLst/>
@@ -4073,8 +4081,8 @@
         </p:nvCxnSpPr>
         <p:spPr>
           <a:xfrm>
-            <a:off x="6137897" y="4048949"/>
-            <a:ext cx="1933344" cy="1347"/>
+            <a:off x="6257818" y="4380990"/>
+            <a:ext cx="2143696" cy="0"/>
           </a:xfrm>
           <a:prstGeom prst="straightConnector1">
             <a:avLst/>
@@ -4112,8 +4120,8 @@
         </p:nvSpPr>
         <p:spPr>
           <a:xfrm>
-            <a:off x="8087751" y="2185682"/>
-            <a:ext cx="1836362" cy="646330"/>
+            <a:off x="8418024" y="2516376"/>
+            <a:ext cx="2039049" cy="646330"/>
           </a:xfrm>
           <a:prstGeom prst="roundRect">
             <a:avLst/>
@@ -4164,8 +4172,8 @@
         </p:nvSpPr>
         <p:spPr>
           <a:xfrm>
-            <a:off x="8091218" y="2952889"/>
-            <a:ext cx="1875581" cy="646330"/>
+            <a:off x="8421493" y="3283583"/>
+            <a:ext cx="2039049" cy="646330"/>
           </a:xfrm>
           <a:prstGeom prst="roundRect">
             <a:avLst/>
@@ -4197,7 +4205,7 @@
             <a:pPr algn="ctr"/>
             <a:r>
               <a:rPr lang="en-SG" sz="1801" dirty="0"/>
-              <a:t>Autofill for Select command</a:t>
+              <a:t>Autofill for Remark command</a:t>
             </a:r>
           </a:p>
         </p:txBody>
@@ -4216,8 +4224,8 @@
         </p:nvSpPr>
         <p:spPr>
           <a:xfrm>
-            <a:off x="8071241" y="3727131"/>
-            <a:ext cx="1878186" cy="646330"/>
+            <a:off x="8401514" y="4057825"/>
+            <a:ext cx="2061145" cy="646330"/>
           </a:xfrm>
           <a:prstGeom prst="roundRect">
             <a:avLst/>
@@ -4249,7 +4257,7 @@
             <a:pPr algn="ctr"/>
             <a:r>
               <a:rPr lang="en-SG" sz="1801" dirty="0"/>
-              <a:t>Autofill for Delete command</a:t>
+              <a:t>Autofill for Rate command</a:t>
             </a:r>
           </a:p>
         </p:txBody>
@@ -4268,7 +4276,7 @@
         </p:nvSpPr>
         <p:spPr>
           <a:xfrm>
-            <a:off x="11520898" y="1357998"/>
+            <a:off x="11942685" y="1677643"/>
             <a:ext cx="1825159" cy="646330"/>
           </a:xfrm>
           <a:prstGeom prst="roundRect">
@@ -4323,9 +4331,9 @@
           <p:nvPr/>
         </p:nvCxnSpPr>
         <p:spPr>
-          <a:xfrm>
-            <a:off x="9912910" y="1681163"/>
-            <a:ext cx="1607988" cy="0"/>
+          <a:xfrm flipV="1">
+            <a:off x="10408561" y="2000808"/>
+            <a:ext cx="1534124" cy="11049"/>
           </a:xfrm>
           <a:prstGeom prst="straightConnector1">
             <a:avLst/>
@@ -4360,14 +4368,15 @@
           </p:cNvPr>
           <p:cNvCxnSpPr>
             <a:cxnSpLocks/>
-            <a:stCxn id="86" idx="3"/>
+            <a:stCxn id="54" idx="3"/>
+            <a:endCxn id="128" idx="1"/>
           </p:cNvCxnSpPr>
           <p:nvPr/>
         </p:nvCxnSpPr>
         <p:spPr>
           <a:xfrm flipV="1">
-            <a:off x="9966799" y="3273045"/>
-            <a:ext cx="632445" cy="3009"/>
+            <a:off x="10462660" y="5141383"/>
+            <a:ext cx="499630" cy="7534"/>
           </a:xfrm>
           <a:prstGeom prst="straightConnector1">
             <a:avLst/>
@@ -4409,8 +4418,8 @@
         </p:nvCxnSpPr>
         <p:spPr>
           <a:xfrm>
-            <a:off x="9924113" y="2508847"/>
-            <a:ext cx="915514" cy="520806"/>
+            <a:off x="10457073" y="2839541"/>
+            <a:ext cx="745600" cy="2061459"/>
           </a:xfrm>
           <a:prstGeom prst="bentConnector2">
             <a:avLst/>
@@ -4445,15 +4454,15 @@
           </p:cNvPr>
           <p:cNvCxnSpPr>
             <a:cxnSpLocks/>
-            <a:stCxn id="87" idx="3"/>
+            <a:stCxn id="84" idx="3"/>
             <a:endCxn id="128" idx="2"/>
           </p:cNvCxnSpPr>
           <p:nvPr/>
         </p:nvCxnSpPr>
         <p:spPr>
           <a:xfrm flipV="1">
-            <a:off x="9949427" y="3510419"/>
-            <a:ext cx="890200" cy="539877"/>
+            <a:off x="10470853" y="5381766"/>
+            <a:ext cx="731820" cy="2114648"/>
           </a:xfrm>
           <a:prstGeom prst="bentConnector2">
             <a:avLst/>
@@ -4491,7 +4500,7 @@
         </p:nvSpPr>
         <p:spPr>
           <a:xfrm>
-            <a:off x="10599244" y="3029653"/>
+            <a:off x="10962290" y="4901000"/>
             <a:ext cx="480766" cy="480766"/>
           </a:xfrm>
           <a:prstGeom prst="diamond">
@@ -4548,7 +4557,7 @@
         </p:nvSpPr>
         <p:spPr>
           <a:xfrm>
-            <a:off x="11520898" y="2952889"/>
+            <a:off x="11942686" y="4808571"/>
             <a:ext cx="1825159" cy="646330"/>
           </a:xfrm>
           <a:prstGeom prst="roundRect">
@@ -4611,9 +4620,9 @@
           <p:nvPr/>
         </p:nvCxnSpPr>
         <p:spPr>
-          <a:xfrm>
-            <a:off x="11080010" y="3270036"/>
-            <a:ext cx="440888" cy="6018"/>
+          <a:xfrm flipV="1">
+            <a:off x="11443056" y="5131736"/>
+            <a:ext cx="499630" cy="9647"/>
           </a:xfrm>
           <a:prstGeom prst="straightConnector1">
             <a:avLst/>
@@ -4654,9 +4663,9 @@
           <p:nvPr/>
         </p:nvCxnSpPr>
         <p:spPr>
-          <a:xfrm>
-            <a:off x="4938655" y="1686217"/>
-            <a:ext cx="958860" cy="0"/>
+          <a:xfrm flipV="1">
+            <a:off x="4869387" y="2016911"/>
+            <a:ext cx="1148049" cy="17104"/>
           </a:xfrm>
           <a:prstGeom prst="straightConnector1">
             <a:avLst/>
@@ -4694,7 +4703,7 @@
         </p:nvSpPr>
         <p:spPr>
           <a:xfrm>
-            <a:off x="8071069" y="5322002"/>
+            <a:off x="8087751" y="9592537"/>
             <a:ext cx="1825159" cy="646330"/>
           </a:xfrm>
           <a:prstGeom prst="roundRect">
@@ -4750,8 +4759,8 @@
         </p:nvCxnSpPr>
         <p:spPr>
           <a:xfrm rot="16200000" flipH="1">
-            <a:off x="4525387" y="2099484"/>
-            <a:ext cx="3718567" cy="3372797"/>
+            <a:off x="2537725" y="4365676"/>
+            <a:ext cx="7641304" cy="3458747"/>
           </a:xfrm>
           <a:prstGeom prst="bentConnector2">
             <a:avLst/>
@@ -4792,9 +4801,9 @@
           <p:nvPr/>
         </p:nvCxnSpPr>
         <p:spPr>
-          <a:xfrm flipV="1">
-            <a:off x="9896228" y="5645166"/>
-            <a:ext cx="4313624" cy="1"/>
+          <a:xfrm>
+            <a:off x="9912910" y="9915702"/>
+            <a:ext cx="4496703" cy="0"/>
           </a:xfrm>
           <a:prstGeom prst="straightConnector1">
             <a:avLst/>
@@ -4832,7 +4841,7 @@
         </p:nvSpPr>
         <p:spPr>
           <a:xfrm>
-            <a:off x="4730548" y="1975632"/>
+            <a:off x="4665228" y="9480854"/>
             <a:ext cx="767864" cy="369460"/>
           </a:xfrm>
           <a:prstGeom prst="rect">
@@ -4869,9 +4878,9 @@
           <p:nvPr/>
         </p:nvCxnSpPr>
         <p:spPr>
-          <a:xfrm flipV="1">
-            <a:off x="13346057" y="3270036"/>
-            <a:ext cx="979513" cy="6018"/>
+          <a:xfrm>
+            <a:off x="13767845" y="5131736"/>
+            <a:ext cx="757486" cy="17181"/>
           </a:xfrm>
           <a:prstGeom prst="line">
             <a:avLst/>
@@ -4902,14 +4911,15 @@
             </a:extLst>
           </p:cNvPr>
           <p:cNvCxnSpPr>
+            <a:cxnSpLocks/>
             <a:stCxn id="39" idx="2"/>
           </p:cNvCxnSpPr>
           <p:nvPr/>
         </p:nvCxnSpPr>
         <p:spPr>
           <a:xfrm rot="16200000" flipH="1">
-            <a:off x="8787206" y="-722708"/>
-            <a:ext cx="2889056" cy="8187672"/>
+            <a:off x="7399247" y="1115866"/>
+            <a:ext cx="5984657" cy="8267512"/>
           </a:xfrm>
           <a:prstGeom prst="bentConnector2">
             <a:avLst/>
@@ -4948,8 +4958,8 @@
         </p:nvCxnSpPr>
         <p:spPr>
           <a:xfrm>
-            <a:off x="6239892" y="732647"/>
-            <a:ext cx="6193586" cy="625351"/>
+            <a:off x="6359813" y="1063342"/>
+            <a:ext cx="6495452" cy="614301"/>
           </a:xfrm>
           <a:prstGeom prst="bentConnector2">
             <a:avLst/>
@@ -4957,6 +4967,870 @@
           <a:ln>
             <a:tailEnd type="triangle"/>
           </a:ln>
+        </p:spPr>
+        <p:style>
+          <a:lnRef idx="1">
+            <a:schemeClr val="dk1"/>
+          </a:lnRef>
+          <a:fillRef idx="0">
+            <a:schemeClr val="dk1"/>
+          </a:fillRef>
+          <a:effectRef idx="0">
+            <a:schemeClr val="dk1"/>
+          </a:effectRef>
+          <a:fontRef idx="minor">
+            <a:schemeClr val="tx1"/>
+          </a:fontRef>
+        </p:style>
+      </p:cxnSp>
+      <p:sp>
+        <p:nvSpPr>
+          <p:cNvPr id="52" name="TextBox 51">
+            <a:extLst>
+              <a:ext uri="{FF2B5EF4-FFF2-40B4-BE49-F238E27FC236}">
+                <a16:creationId xmlns:a16="http://schemas.microsoft.com/office/drawing/2014/main" id="{D50548DA-6EE0-454F-80BE-DAB022232C20}"/>
+              </a:ext>
+            </a:extLst>
+          </p:cNvPr>
+          <p:cNvSpPr txBox="1"/>
+          <p:nvPr/>
+        </p:nvSpPr>
+        <p:spPr>
+          <a:xfrm>
+            <a:off x="6277783" y="4771923"/>
+            <a:ext cx="2161954" cy="369460"/>
+          </a:xfrm>
+          <a:prstGeom prst="rect">
+            <a:avLst/>
+          </a:prstGeom>
+          <a:noFill/>
+        </p:spPr>
+        <p:txBody>
+          <a:bodyPr wrap="square" rtlCol="0">
+            <a:spAutoFit/>
+          </a:bodyPr>
+          <a:lstStyle/>
+          <a:p>
+            <a:r>
+              <a:rPr lang="en-SG" sz="1801" dirty="0"/>
+              <a:t>[Delete command]</a:t>
+            </a:r>
+          </a:p>
+        </p:txBody>
+      </p:sp>
+      <p:cxnSp>
+        <p:nvCxnSpPr>
+          <p:cNvPr id="53" name="Straight Arrow Connector 52">
+            <a:extLst>
+              <a:ext uri="{FF2B5EF4-FFF2-40B4-BE49-F238E27FC236}">
+                <a16:creationId xmlns:a16="http://schemas.microsoft.com/office/drawing/2014/main" id="{D380E9A7-8D39-4147-808A-9C27666CFC92}"/>
+              </a:ext>
+            </a:extLst>
+          </p:cNvPr>
+          <p:cNvCxnSpPr>
+            <a:cxnSpLocks/>
+            <a:endCxn id="54" idx="1"/>
+          </p:cNvCxnSpPr>
+          <p:nvPr/>
+        </p:nvCxnSpPr>
+        <p:spPr>
+          <a:xfrm>
+            <a:off x="6264945" y="5148917"/>
+            <a:ext cx="2144763" cy="0"/>
+          </a:xfrm>
+          <a:prstGeom prst="straightConnector1">
+            <a:avLst/>
+          </a:prstGeom>
+          <a:ln>
+            <a:tailEnd type="triangle"/>
+          </a:ln>
+        </p:spPr>
+        <p:style>
+          <a:lnRef idx="1">
+            <a:schemeClr val="dk1"/>
+          </a:lnRef>
+          <a:fillRef idx="0">
+            <a:schemeClr val="dk1"/>
+          </a:fillRef>
+          <a:effectRef idx="0">
+            <a:schemeClr val="dk1"/>
+          </a:effectRef>
+          <a:fontRef idx="minor">
+            <a:schemeClr val="tx1"/>
+          </a:fontRef>
+        </p:style>
+      </p:cxnSp>
+      <p:sp>
+        <p:nvSpPr>
+          <p:cNvPr id="54" name="Rectangle: Rounded Corners 53">
+            <a:extLst>
+              <a:ext uri="{FF2B5EF4-FFF2-40B4-BE49-F238E27FC236}">
+                <a16:creationId xmlns:a16="http://schemas.microsoft.com/office/drawing/2014/main" id="{3FF17CFA-CAEB-49DE-A105-CB4D4B3FE157}"/>
+              </a:ext>
+            </a:extLst>
+          </p:cNvPr>
+          <p:cNvSpPr/>
+          <p:nvPr/>
+        </p:nvSpPr>
+        <p:spPr>
+          <a:xfrm>
+            <a:off x="8409708" y="4825752"/>
+            <a:ext cx="2052952" cy="646330"/>
+          </a:xfrm>
+          <a:prstGeom prst="roundRect">
+            <a:avLst/>
+          </a:prstGeom>
+        </p:spPr>
+        <p:style>
+          <a:lnRef idx="1">
+            <a:schemeClr val="accent6"/>
+          </a:lnRef>
+          <a:fillRef idx="2">
+            <a:schemeClr val="accent6"/>
+          </a:fillRef>
+          <a:effectRef idx="1">
+            <a:schemeClr val="accent6"/>
+          </a:effectRef>
+          <a:fontRef idx="minor">
+            <a:schemeClr val="dk1"/>
+          </a:fontRef>
+        </p:style>
+        <p:txBody>
+          <a:bodyPr rot="0" spcFirstLastPara="0" vertOverflow="overflow" horzOverflow="overflow" vert="horz" wrap="square" lIns="91440" tIns="45721" rIns="91440" bIns="45721" numCol="1" spcCol="0" rtlCol="0" fromWordArt="0" anchor="ctr" anchorCtr="0" forceAA="0" compatLnSpc="1">
+            <a:prstTxWarp prst="textNoShape">
+              <a:avLst/>
+            </a:prstTxWarp>
+            <a:noAutofit/>
+          </a:bodyPr>
+          <a:lstStyle/>
+          <a:p>
+            <a:pPr algn="ctr"/>
+            <a:r>
+              <a:rPr lang="en-SG" sz="1801" dirty="0"/>
+              <a:t>Autofill for Delete command</a:t>
+            </a:r>
+          </a:p>
+        </p:txBody>
+      </p:sp>
+      <p:sp>
+        <p:nvSpPr>
+          <p:cNvPr id="70" name="TextBox 69">
+            <a:extLst>
+              <a:ext uri="{FF2B5EF4-FFF2-40B4-BE49-F238E27FC236}">
+                <a16:creationId xmlns:a16="http://schemas.microsoft.com/office/drawing/2014/main" id="{29CFFA9E-BBBB-4A02-8DF4-8AD3D10C3A23}"/>
+              </a:ext>
+            </a:extLst>
+          </p:cNvPr>
+          <p:cNvSpPr txBox="1"/>
+          <p:nvPr/>
+        </p:nvSpPr>
+        <p:spPr>
+          <a:xfrm>
+            <a:off x="6269345" y="5601373"/>
+            <a:ext cx="2153081" cy="369460"/>
+          </a:xfrm>
+          <a:prstGeom prst="rect">
+            <a:avLst/>
+          </a:prstGeom>
+          <a:noFill/>
+        </p:spPr>
+        <p:txBody>
+          <a:bodyPr wrap="square" rtlCol="0">
+            <a:spAutoFit/>
+          </a:bodyPr>
+          <a:lstStyle/>
+          <a:p>
+            <a:r>
+              <a:rPr lang="en-SG" sz="1801" dirty="0"/>
+              <a:t>[Select command]</a:t>
+            </a:r>
+          </a:p>
+        </p:txBody>
+      </p:sp>
+      <p:sp>
+        <p:nvSpPr>
+          <p:cNvPr id="72" name="TextBox 71">
+            <a:extLst>
+              <a:ext uri="{FF2B5EF4-FFF2-40B4-BE49-F238E27FC236}">
+                <a16:creationId xmlns:a16="http://schemas.microsoft.com/office/drawing/2014/main" id="{90A4FA47-1D78-420A-9A70-8C0F17BCE52A}"/>
+              </a:ext>
+            </a:extLst>
+          </p:cNvPr>
+          <p:cNvSpPr txBox="1"/>
+          <p:nvPr/>
+        </p:nvSpPr>
+        <p:spPr>
+          <a:xfrm>
+            <a:off x="6252279" y="6351493"/>
+            <a:ext cx="2187458" cy="369460"/>
+          </a:xfrm>
+          <a:prstGeom prst="rect">
+            <a:avLst/>
+          </a:prstGeom>
+          <a:noFill/>
+        </p:spPr>
+        <p:txBody>
+          <a:bodyPr wrap="square" rtlCol="0">
+            <a:spAutoFit/>
+          </a:bodyPr>
+          <a:lstStyle/>
+          <a:p>
+            <a:r>
+              <a:rPr lang="en-SG" sz="1801" dirty="0"/>
+              <a:t>[</a:t>
+            </a:r>
+            <a:r>
+              <a:rPr lang="en-SG" sz="1801" dirty="0" err="1"/>
+              <a:t>Unmatch</a:t>
+            </a:r>
+            <a:r>
+              <a:rPr lang="en-SG" sz="1801" dirty="0"/>
+              <a:t> command]</a:t>
+            </a:r>
+          </a:p>
+        </p:txBody>
+      </p:sp>
+      <p:cxnSp>
+        <p:nvCxnSpPr>
+          <p:cNvPr id="74" name="Straight Arrow Connector 73">
+            <a:extLst>
+              <a:ext uri="{FF2B5EF4-FFF2-40B4-BE49-F238E27FC236}">
+                <a16:creationId xmlns:a16="http://schemas.microsoft.com/office/drawing/2014/main" id="{A238B2D0-0F58-41E0-ABB5-424DC5922C2B}"/>
+              </a:ext>
+            </a:extLst>
+          </p:cNvPr>
+          <p:cNvCxnSpPr>
+            <a:cxnSpLocks/>
+            <a:endCxn id="77" idx="1"/>
+          </p:cNvCxnSpPr>
+          <p:nvPr/>
+        </p:nvCxnSpPr>
+        <p:spPr>
+          <a:xfrm flipV="1">
+            <a:off x="6260472" y="5954245"/>
+            <a:ext cx="2143710" cy="16588"/>
+          </a:xfrm>
+          <a:prstGeom prst="straightConnector1">
+            <a:avLst/>
+          </a:prstGeom>
+          <a:ln>
+            <a:tailEnd type="triangle"/>
+          </a:ln>
+        </p:spPr>
+        <p:style>
+          <a:lnRef idx="1">
+            <a:schemeClr val="dk1"/>
+          </a:lnRef>
+          <a:fillRef idx="0">
+            <a:schemeClr val="dk1"/>
+          </a:fillRef>
+          <a:effectRef idx="0">
+            <a:schemeClr val="dk1"/>
+          </a:effectRef>
+          <a:fontRef idx="minor">
+            <a:schemeClr val="tx1"/>
+          </a:fontRef>
+        </p:style>
+      </p:cxnSp>
+      <p:cxnSp>
+        <p:nvCxnSpPr>
+          <p:cNvPr id="76" name="Straight Arrow Connector 75">
+            <a:extLst>
+              <a:ext uri="{FF2B5EF4-FFF2-40B4-BE49-F238E27FC236}">
+                <a16:creationId xmlns:a16="http://schemas.microsoft.com/office/drawing/2014/main" id="{F862923A-F186-4C87-A9DD-59ED8ED768A4}"/>
+              </a:ext>
+            </a:extLst>
+          </p:cNvPr>
+          <p:cNvCxnSpPr>
+            <a:cxnSpLocks/>
+            <a:endCxn id="78" idx="1"/>
+          </p:cNvCxnSpPr>
+          <p:nvPr/>
+        </p:nvCxnSpPr>
+        <p:spPr>
+          <a:xfrm>
+            <a:off x="6240507" y="6728487"/>
+            <a:ext cx="2143696" cy="0"/>
+          </a:xfrm>
+          <a:prstGeom prst="straightConnector1">
+            <a:avLst/>
+          </a:prstGeom>
+          <a:ln>
+            <a:tailEnd type="triangle"/>
+          </a:ln>
+        </p:spPr>
+        <p:style>
+          <a:lnRef idx="1">
+            <a:schemeClr val="dk1"/>
+          </a:lnRef>
+          <a:fillRef idx="0">
+            <a:schemeClr val="dk1"/>
+          </a:fillRef>
+          <a:effectRef idx="0">
+            <a:schemeClr val="dk1"/>
+          </a:effectRef>
+          <a:fontRef idx="minor">
+            <a:schemeClr val="tx1"/>
+          </a:fontRef>
+        </p:style>
+      </p:cxnSp>
+      <p:sp>
+        <p:nvSpPr>
+          <p:cNvPr id="77" name="Rectangle: Rounded Corners 76">
+            <a:extLst>
+              <a:ext uri="{FF2B5EF4-FFF2-40B4-BE49-F238E27FC236}">
+                <a16:creationId xmlns:a16="http://schemas.microsoft.com/office/drawing/2014/main" id="{686CB654-6EE0-4162-8F41-7D4AFDB36EF1}"/>
+              </a:ext>
+            </a:extLst>
+          </p:cNvPr>
+          <p:cNvSpPr/>
+          <p:nvPr/>
+        </p:nvSpPr>
+        <p:spPr>
+          <a:xfrm>
+            <a:off x="8404182" y="5631080"/>
+            <a:ext cx="2058478" cy="646330"/>
+          </a:xfrm>
+          <a:prstGeom prst="roundRect">
+            <a:avLst/>
+          </a:prstGeom>
+        </p:spPr>
+        <p:style>
+          <a:lnRef idx="1">
+            <a:schemeClr val="accent6"/>
+          </a:lnRef>
+          <a:fillRef idx="2">
+            <a:schemeClr val="accent6"/>
+          </a:fillRef>
+          <a:effectRef idx="1">
+            <a:schemeClr val="accent6"/>
+          </a:effectRef>
+          <a:fontRef idx="minor">
+            <a:schemeClr val="dk1"/>
+          </a:fontRef>
+        </p:style>
+        <p:txBody>
+          <a:bodyPr rot="0" spcFirstLastPara="0" vertOverflow="overflow" horzOverflow="overflow" vert="horz" wrap="square" lIns="91440" tIns="45721" rIns="91440" bIns="45721" numCol="1" spcCol="0" rtlCol="0" fromWordArt="0" anchor="ctr" anchorCtr="0" forceAA="0" compatLnSpc="1">
+            <a:prstTxWarp prst="textNoShape">
+              <a:avLst/>
+            </a:prstTxWarp>
+            <a:noAutofit/>
+          </a:bodyPr>
+          <a:lstStyle/>
+          <a:p>
+            <a:pPr algn="ctr"/>
+            <a:r>
+              <a:rPr lang="en-SG" sz="1801" dirty="0"/>
+              <a:t>Autofill for Select command</a:t>
+            </a:r>
+          </a:p>
+        </p:txBody>
+      </p:sp>
+      <p:sp>
+        <p:nvSpPr>
+          <p:cNvPr id="78" name="Rectangle: Rounded Corners 77">
+            <a:extLst>
+              <a:ext uri="{FF2B5EF4-FFF2-40B4-BE49-F238E27FC236}">
+                <a16:creationId xmlns:a16="http://schemas.microsoft.com/office/drawing/2014/main" id="{70FF6374-016D-41A5-9954-62F64FDD858A}"/>
+              </a:ext>
+            </a:extLst>
+          </p:cNvPr>
+          <p:cNvSpPr/>
+          <p:nvPr/>
+        </p:nvSpPr>
+        <p:spPr>
+          <a:xfrm>
+            <a:off x="8384203" y="6405322"/>
+            <a:ext cx="2078457" cy="646330"/>
+          </a:xfrm>
+          <a:prstGeom prst="roundRect">
+            <a:avLst/>
+          </a:prstGeom>
+        </p:spPr>
+        <p:style>
+          <a:lnRef idx="1">
+            <a:schemeClr val="accent6"/>
+          </a:lnRef>
+          <a:fillRef idx="2">
+            <a:schemeClr val="accent6"/>
+          </a:fillRef>
+          <a:effectRef idx="1">
+            <a:schemeClr val="accent6"/>
+          </a:effectRef>
+          <a:fontRef idx="minor">
+            <a:schemeClr val="dk1"/>
+          </a:fontRef>
+        </p:style>
+        <p:txBody>
+          <a:bodyPr rot="0" spcFirstLastPara="0" vertOverflow="overflow" horzOverflow="overflow" vert="horz" wrap="square" lIns="91440" tIns="45721" rIns="91440" bIns="45721" numCol="1" spcCol="0" rtlCol="0" fromWordArt="0" anchor="ctr" anchorCtr="0" forceAA="0" compatLnSpc="1">
+            <a:prstTxWarp prst="textNoShape">
+              <a:avLst/>
+            </a:prstTxWarp>
+            <a:noAutofit/>
+          </a:bodyPr>
+          <a:lstStyle/>
+          <a:p>
+            <a:pPr algn="ctr"/>
+            <a:r>
+              <a:rPr lang="en-SG" sz="1801" dirty="0"/>
+              <a:t>Autofill for </a:t>
+            </a:r>
+            <a:r>
+              <a:rPr lang="en-SG" sz="1801" dirty="0" err="1"/>
+              <a:t>Unmatch</a:t>
+            </a:r>
+            <a:r>
+              <a:rPr lang="en-SG" sz="1801" dirty="0"/>
+              <a:t> command</a:t>
+            </a:r>
+          </a:p>
+        </p:txBody>
+      </p:sp>
+      <p:sp>
+        <p:nvSpPr>
+          <p:cNvPr id="82" name="TextBox 81">
+            <a:extLst>
+              <a:ext uri="{FF2B5EF4-FFF2-40B4-BE49-F238E27FC236}">
+                <a16:creationId xmlns:a16="http://schemas.microsoft.com/office/drawing/2014/main" id="{A87568EA-13F8-4A97-9B54-6F12DBCFD2FC}"/>
+              </a:ext>
+            </a:extLst>
+          </p:cNvPr>
+          <p:cNvSpPr txBox="1"/>
+          <p:nvPr/>
+        </p:nvSpPr>
+        <p:spPr>
+          <a:xfrm>
+            <a:off x="6260472" y="7119420"/>
+            <a:ext cx="2161954" cy="369460"/>
+          </a:xfrm>
+          <a:prstGeom prst="rect">
+            <a:avLst/>
+          </a:prstGeom>
+          <a:noFill/>
+        </p:spPr>
+        <p:txBody>
+          <a:bodyPr wrap="square" rtlCol="0">
+            <a:spAutoFit/>
+          </a:bodyPr>
+          <a:lstStyle/>
+          <a:p>
+            <a:r>
+              <a:rPr lang="en-SG" sz="1801" dirty="0"/>
+              <a:t>[Match command]</a:t>
+            </a:r>
+          </a:p>
+        </p:txBody>
+      </p:sp>
+      <p:cxnSp>
+        <p:nvCxnSpPr>
+          <p:cNvPr id="83" name="Straight Arrow Connector 82">
+            <a:extLst>
+              <a:ext uri="{FF2B5EF4-FFF2-40B4-BE49-F238E27FC236}">
+                <a16:creationId xmlns:a16="http://schemas.microsoft.com/office/drawing/2014/main" id="{6B1A63BC-6C9A-43D5-9E7D-8C09C9D34547}"/>
+              </a:ext>
+            </a:extLst>
+          </p:cNvPr>
+          <p:cNvCxnSpPr>
+            <a:cxnSpLocks/>
+            <a:endCxn id="84" idx="1"/>
+          </p:cNvCxnSpPr>
+          <p:nvPr/>
+        </p:nvCxnSpPr>
+        <p:spPr>
+          <a:xfrm>
+            <a:off x="6247634" y="7496414"/>
+            <a:ext cx="2144762" cy="0"/>
+          </a:xfrm>
+          <a:prstGeom prst="straightConnector1">
+            <a:avLst/>
+          </a:prstGeom>
+          <a:ln>
+            <a:tailEnd type="triangle"/>
+          </a:ln>
+        </p:spPr>
+        <p:style>
+          <a:lnRef idx="1">
+            <a:schemeClr val="dk1"/>
+          </a:lnRef>
+          <a:fillRef idx="0">
+            <a:schemeClr val="dk1"/>
+          </a:fillRef>
+          <a:effectRef idx="0">
+            <a:schemeClr val="dk1"/>
+          </a:effectRef>
+          <a:fontRef idx="minor">
+            <a:schemeClr val="tx1"/>
+          </a:fontRef>
+        </p:style>
+      </p:cxnSp>
+      <p:sp>
+        <p:nvSpPr>
+          <p:cNvPr id="84" name="Rectangle: Rounded Corners 83">
+            <a:extLst>
+              <a:ext uri="{FF2B5EF4-FFF2-40B4-BE49-F238E27FC236}">
+                <a16:creationId xmlns:a16="http://schemas.microsoft.com/office/drawing/2014/main" id="{53023647-6797-40C3-86C7-B851B5A83183}"/>
+              </a:ext>
+            </a:extLst>
+          </p:cNvPr>
+          <p:cNvSpPr/>
+          <p:nvPr/>
+        </p:nvSpPr>
+        <p:spPr>
+          <a:xfrm>
+            <a:off x="8392396" y="7173249"/>
+            <a:ext cx="2078457" cy="646330"/>
+          </a:xfrm>
+          <a:prstGeom prst="roundRect">
+            <a:avLst/>
+          </a:prstGeom>
+        </p:spPr>
+        <p:style>
+          <a:lnRef idx="1">
+            <a:schemeClr val="accent6"/>
+          </a:lnRef>
+          <a:fillRef idx="2">
+            <a:schemeClr val="accent6"/>
+          </a:fillRef>
+          <a:effectRef idx="1">
+            <a:schemeClr val="accent6"/>
+          </a:effectRef>
+          <a:fontRef idx="minor">
+            <a:schemeClr val="dk1"/>
+          </a:fontRef>
+        </p:style>
+        <p:txBody>
+          <a:bodyPr rot="0" spcFirstLastPara="0" vertOverflow="overflow" horzOverflow="overflow" vert="horz" wrap="square" lIns="91440" tIns="45721" rIns="91440" bIns="45721" numCol="1" spcCol="0" rtlCol="0" fromWordArt="0" anchor="ctr" anchorCtr="0" forceAA="0" compatLnSpc="1">
+            <a:prstTxWarp prst="textNoShape">
+              <a:avLst/>
+            </a:prstTxWarp>
+            <a:noAutofit/>
+          </a:bodyPr>
+          <a:lstStyle/>
+          <a:p>
+            <a:pPr algn="ctr"/>
+            <a:r>
+              <a:rPr lang="en-SG" sz="1801" dirty="0"/>
+              <a:t>Autofill for Match command</a:t>
+            </a:r>
+          </a:p>
+        </p:txBody>
+      </p:sp>
+      <p:sp>
+        <p:nvSpPr>
+          <p:cNvPr id="91" name="Rectangle: Rounded Corners 90">
+            <a:extLst>
+              <a:ext uri="{FF2B5EF4-FFF2-40B4-BE49-F238E27FC236}">
+                <a16:creationId xmlns:a16="http://schemas.microsoft.com/office/drawing/2014/main" id="{B786A3F3-ABCD-4434-BB3E-CDD0478867B8}"/>
+              </a:ext>
+            </a:extLst>
+          </p:cNvPr>
+          <p:cNvSpPr/>
+          <p:nvPr/>
+        </p:nvSpPr>
+        <p:spPr>
+          <a:xfrm>
+            <a:off x="8087751" y="8633512"/>
+            <a:ext cx="1825159" cy="646330"/>
+          </a:xfrm>
+          <a:prstGeom prst="roundRect">
+            <a:avLst/>
+          </a:prstGeom>
+        </p:spPr>
+        <p:style>
+          <a:lnRef idx="1">
+            <a:schemeClr val="accent3"/>
+          </a:lnRef>
+          <a:fillRef idx="2">
+            <a:schemeClr val="accent3"/>
+          </a:fillRef>
+          <a:effectRef idx="1">
+            <a:schemeClr val="accent3"/>
+          </a:effectRef>
+          <a:fontRef idx="minor">
+            <a:schemeClr val="dk1"/>
+          </a:fontRef>
+        </p:style>
+        <p:txBody>
+          <a:bodyPr rot="0" spcFirstLastPara="0" vertOverflow="overflow" horzOverflow="overflow" vert="horz" wrap="square" lIns="91440" tIns="45721" rIns="91440" bIns="45721" numCol="1" spcCol="0" rtlCol="0" fromWordArt="0" anchor="ctr" anchorCtr="0" forceAA="0" compatLnSpc="1">
+            <a:prstTxWarp prst="textNoShape">
+              <a:avLst/>
+            </a:prstTxWarp>
+            <a:noAutofit/>
+          </a:bodyPr>
+          <a:lstStyle/>
+          <a:p>
+            <a:pPr algn="ctr"/>
+            <a:r>
+              <a:rPr lang="en-SG" sz="1801" dirty="0"/>
+              <a:t>Select index to edit</a:t>
+            </a:r>
+          </a:p>
+        </p:txBody>
+      </p:sp>
+      <p:cxnSp>
+        <p:nvCxnSpPr>
+          <p:cNvPr id="92" name="Straight Arrow Connector 91">
+            <a:extLst>
+              <a:ext uri="{FF2B5EF4-FFF2-40B4-BE49-F238E27FC236}">
+                <a16:creationId xmlns:a16="http://schemas.microsoft.com/office/drawing/2014/main" id="{9789D2CF-CF49-41A4-B92E-BA0E2E23B49E}"/>
+              </a:ext>
+            </a:extLst>
+          </p:cNvPr>
+          <p:cNvCxnSpPr>
+            <a:cxnSpLocks/>
+            <a:endCxn id="91" idx="1"/>
+          </p:cNvCxnSpPr>
+          <p:nvPr/>
+        </p:nvCxnSpPr>
+        <p:spPr>
+          <a:xfrm>
+            <a:off x="4629003" y="8956677"/>
+            <a:ext cx="3458748" cy="0"/>
+          </a:xfrm>
+          <a:prstGeom prst="straightConnector1">
+            <a:avLst/>
+          </a:prstGeom>
+          <a:ln>
+            <a:tailEnd type="triangle"/>
+          </a:ln>
+        </p:spPr>
+        <p:style>
+          <a:lnRef idx="1">
+            <a:schemeClr val="dk1"/>
+          </a:lnRef>
+          <a:fillRef idx="0">
+            <a:schemeClr val="dk1"/>
+          </a:fillRef>
+          <a:effectRef idx="0">
+            <a:schemeClr val="dk1"/>
+          </a:effectRef>
+          <a:fontRef idx="minor">
+            <a:schemeClr val="tx1"/>
+          </a:fontRef>
+        </p:style>
+      </p:cxnSp>
+      <p:sp>
+        <p:nvSpPr>
+          <p:cNvPr id="94" name="TextBox 93">
+            <a:extLst>
+              <a:ext uri="{FF2B5EF4-FFF2-40B4-BE49-F238E27FC236}">
+                <a16:creationId xmlns:a16="http://schemas.microsoft.com/office/drawing/2014/main" id="{8899E382-6829-45B5-BC95-AE311526BED3}"/>
+              </a:ext>
+            </a:extLst>
+          </p:cNvPr>
+          <p:cNvSpPr txBox="1"/>
+          <p:nvPr/>
+        </p:nvSpPr>
+        <p:spPr>
+          <a:xfrm>
+            <a:off x="4665228" y="8521960"/>
+            <a:ext cx="2143695" cy="369460"/>
+          </a:xfrm>
+          <a:prstGeom prst="rect">
+            <a:avLst/>
+          </a:prstGeom>
+          <a:noFill/>
+        </p:spPr>
+        <p:txBody>
+          <a:bodyPr wrap="square" rtlCol="0">
+            <a:spAutoFit/>
+          </a:bodyPr>
+          <a:lstStyle/>
+          <a:p>
+            <a:r>
+              <a:rPr lang="en-SG" sz="1801" dirty="0"/>
+              <a:t>[</a:t>
+            </a:r>
+            <a:r>
+              <a:rPr lang="en-SG" sz="1801" dirty="0" err="1"/>
+              <a:t>isMatchCommand</a:t>
+            </a:r>
+            <a:r>
+              <a:rPr lang="en-SG" sz="1801" dirty="0"/>
+              <a:t>]</a:t>
+            </a:r>
+          </a:p>
+        </p:txBody>
+      </p:sp>
+      <p:cxnSp>
+        <p:nvCxnSpPr>
+          <p:cNvPr id="125" name="Straight Connector 124">
+            <a:extLst>
+              <a:ext uri="{FF2B5EF4-FFF2-40B4-BE49-F238E27FC236}">
+                <a16:creationId xmlns:a16="http://schemas.microsoft.com/office/drawing/2014/main" id="{1D3BD8E0-BA08-43FA-8737-AFDE4A8C0BA5}"/>
+              </a:ext>
+            </a:extLst>
+          </p:cNvPr>
+          <p:cNvCxnSpPr>
+            <a:cxnSpLocks/>
+            <a:stCxn id="86" idx="3"/>
+          </p:cNvCxnSpPr>
+          <p:nvPr/>
+        </p:nvCxnSpPr>
+        <p:spPr>
+          <a:xfrm>
+            <a:off x="10460542" y="3606748"/>
+            <a:ext cx="742131" cy="0"/>
+          </a:xfrm>
+          <a:prstGeom prst="line">
+            <a:avLst/>
+          </a:prstGeom>
+        </p:spPr>
+        <p:style>
+          <a:lnRef idx="1">
+            <a:schemeClr val="dk1"/>
+          </a:lnRef>
+          <a:fillRef idx="0">
+            <a:schemeClr val="dk1"/>
+          </a:fillRef>
+          <a:effectRef idx="0">
+            <a:schemeClr val="dk1"/>
+          </a:effectRef>
+          <a:fontRef idx="minor">
+            <a:schemeClr val="tx1"/>
+          </a:fontRef>
+        </p:style>
+      </p:cxnSp>
+      <p:cxnSp>
+        <p:nvCxnSpPr>
+          <p:cNvPr id="129" name="Straight Connector 128">
+            <a:extLst>
+              <a:ext uri="{FF2B5EF4-FFF2-40B4-BE49-F238E27FC236}">
+                <a16:creationId xmlns:a16="http://schemas.microsoft.com/office/drawing/2014/main" id="{682CE03C-7EBA-41BE-A637-E15A71B8AA9D}"/>
+              </a:ext>
+            </a:extLst>
+          </p:cNvPr>
+          <p:cNvCxnSpPr>
+            <a:cxnSpLocks/>
+            <a:stCxn id="87" idx="3"/>
+          </p:cNvCxnSpPr>
+          <p:nvPr/>
+        </p:nvCxnSpPr>
+        <p:spPr>
+          <a:xfrm>
+            <a:off x="10462659" y="4380990"/>
+            <a:ext cx="740014" cy="0"/>
+          </a:xfrm>
+          <a:prstGeom prst="line">
+            <a:avLst/>
+          </a:prstGeom>
+        </p:spPr>
+        <p:style>
+          <a:lnRef idx="1">
+            <a:schemeClr val="dk1"/>
+          </a:lnRef>
+          <a:fillRef idx="0">
+            <a:schemeClr val="dk1"/>
+          </a:fillRef>
+          <a:effectRef idx="0">
+            <a:schemeClr val="dk1"/>
+          </a:effectRef>
+          <a:fontRef idx="minor">
+            <a:schemeClr val="tx1"/>
+          </a:fontRef>
+        </p:style>
+      </p:cxnSp>
+      <p:cxnSp>
+        <p:nvCxnSpPr>
+          <p:cNvPr id="130" name="Straight Connector 129">
+            <a:extLst>
+              <a:ext uri="{FF2B5EF4-FFF2-40B4-BE49-F238E27FC236}">
+                <a16:creationId xmlns:a16="http://schemas.microsoft.com/office/drawing/2014/main" id="{849FAA69-1E51-4452-8C0F-EEF21F4AECBE}"/>
+              </a:ext>
+            </a:extLst>
+          </p:cNvPr>
+          <p:cNvCxnSpPr>
+            <a:cxnSpLocks/>
+            <a:stCxn id="77" idx="3"/>
+          </p:cNvCxnSpPr>
+          <p:nvPr/>
+        </p:nvCxnSpPr>
+        <p:spPr>
+          <a:xfrm>
+            <a:off x="10462660" y="5954245"/>
+            <a:ext cx="740013" cy="7171"/>
+          </a:xfrm>
+          <a:prstGeom prst="line">
+            <a:avLst/>
+          </a:prstGeom>
+        </p:spPr>
+        <p:style>
+          <a:lnRef idx="1">
+            <a:schemeClr val="dk1"/>
+          </a:lnRef>
+          <a:fillRef idx="0">
+            <a:schemeClr val="dk1"/>
+          </a:fillRef>
+          <a:effectRef idx="0">
+            <a:schemeClr val="dk1"/>
+          </a:effectRef>
+          <a:fontRef idx="minor">
+            <a:schemeClr val="tx1"/>
+          </a:fontRef>
+        </p:style>
+      </p:cxnSp>
+      <p:cxnSp>
+        <p:nvCxnSpPr>
+          <p:cNvPr id="133" name="Straight Connector 132">
+            <a:extLst>
+              <a:ext uri="{FF2B5EF4-FFF2-40B4-BE49-F238E27FC236}">
+                <a16:creationId xmlns:a16="http://schemas.microsoft.com/office/drawing/2014/main" id="{B90A81F7-4846-4A68-B421-3ED9917AE6DB}"/>
+              </a:ext>
+            </a:extLst>
+          </p:cNvPr>
+          <p:cNvCxnSpPr>
+            <a:cxnSpLocks/>
+            <a:stCxn id="78" idx="3"/>
+          </p:cNvCxnSpPr>
+          <p:nvPr/>
+        </p:nvCxnSpPr>
+        <p:spPr>
+          <a:xfrm>
+            <a:off x="10462660" y="6728487"/>
+            <a:ext cx="740013" cy="0"/>
+          </a:xfrm>
+          <a:prstGeom prst="line">
+            <a:avLst/>
+          </a:prstGeom>
+        </p:spPr>
+        <p:style>
+          <a:lnRef idx="1">
+            <a:schemeClr val="dk1"/>
+          </a:lnRef>
+          <a:fillRef idx="0">
+            <a:schemeClr val="dk1"/>
+          </a:fillRef>
+          <a:effectRef idx="0">
+            <a:schemeClr val="dk1"/>
+          </a:effectRef>
+          <a:fontRef idx="minor">
+            <a:schemeClr val="tx1"/>
+          </a:fontRef>
+        </p:style>
+      </p:cxnSp>
+      <p:cxnSp>
+        <p:nvCxnSpPr>
+          <p:cNvPr id="136" name="Straight Connector 135">
+            <a:extLst>
+              <a:ext uri="{FF2B5EF4-FFF2-40B4-BE49-F238E27FC236}">
+                <a16:creationId xmlns:a16="http://schemas.microsoft.com/office/drawing/2014/main" id="{D3378F84-2C7D-49D0-8532-56D4DC877A4E}"/>
+              </a:ext>
+            </a:extLst>
+          </p:cNvPr>
+          <p:cNvCxnSpPr>
+            <a:cxnSpLocks/>
+            <a:stCxn id="91" idx="3"/>
+          </p:cNvCxnSpPr>
+          <p:nvPr/>
+        </p:nvCxnSpPr>
+        <p:spPr>
+          <a:xfrm>
+            <a:off x="9912910" y="8956677"/>
+            <a:ext cx="4612421" cy="27687"/>
+          </a:xfrm>
+          <a:prstGeom prst="line">
+            <a:avLst/>
+          </a:prstGeom>
         </p:spPr>
         <p:style>
           <a:lnRef idx="1">

</xml_diff>